<commit_message>
updated heatmaps and volcano plots
</commit_message>
<xml_diff>
--- a/SSU11755_RNAseqsummary_01032020.pptx
+++ b/SSU11755_RNAseqsummary_01032020.pptx
@@ -11,20 +11,23 @@
     <p:sldId id="275" r:id="rId5"/>
     <p:sldId id="277" r:id="rId6"/>
     <p:sldId id="278" r:id="rId7"/>
-    <p:sldId id="279" r:id="rId8"/>
+    <p:sldId id="293" r:id="rId8"/>
     <p:sldId id="280" r:id="rId9"/>
     <p:sldId id="281" r:id="rId10"/>
     <p:sldId id="285" r:id="rId11"/>
     <p:sldId id="282" r:id="rId12"/>
     <p:sldId id="287" r:id="rId13"/>
     <p:sldId id="284" r:id="rId14"/>
-    <p:sldId id="286" r:id="rId15"/>
-    <p:sldId id="288" r:id="rId16"/>
-    <p:sldId id="291" r:id="rId17"/>
-    <p:sldId id="292" r:id="rId18"/>
-    <p:sldId id="290" r:id="rId19"/>
-    <p:sldId id="267" r:id="rId20"/>
-    <p:sldId id="274" r:id="rId21"/>
+    <p:sldId id="294" r:id="rId15"/>
+    <p:sldId id="286" r:id="rId16"/>
+    <p:sldId id="288" r:id="rId17"/>
+    <p:sldId id="296" r:id="rId18"/>
+    <p:sldId id="291" r:id="rId19"/>
+    <p:sldId id="292" r:id="rId20"/>
+    <p:sldId id="297" r:id="rId21"/>
+    <p:sldId id="290" r:id="rId22"/>
+    <p:sldId id="267" r:id="rId23"/>
+    <p:sldId id="274" r:id="rId24"/>
   </p:sldIdLst>
   <p:sldSz cx="12192000" cy="6858000"/>
   <p:notesSz cx="6858000" cy="9144000"/>
@@ -3561,11 +3564,7 @@
             </a:r>
             <a:r>
               <a:rPr lang="en-US" sz="2000" dirty="0" smtClean="0"/>
-              <a:t>&lt;</a:t>
-            </a:r>
-            <a:r>
-              <a:rPr lang="en-US" sz="2000" dirty="0" smtClean="0"/>
-              <a:t>7</a:t>
+              <a:t>&lt;7</a:t>
             </a:r>
           </a:p>
           <a:p>
@@ -3769,11 +3768,7 @@
             <a:pPr marL="742950" lvl="1" indent="-285750"/>
             <a:r>
               <a:rPr lang="en-US" sz="1800" dirty="0" smtClean="0"/>
-              <a:t>VIM</a:t>
-            </a:r>
-            <a:r>
-              <a:rPr lang="en-US" sz="1800" dirty="0" smtClean="0"/>
-              <a:t> </a:t>
+              <a:t>VIM </a:t>
             </a:r>
             <a:r>
               <a:rPr lang="en-US" sz="1800" dirty="0"/>
@@ -3781,11 +3776,7 @@
             </a:r>
             <a:r>
               <a:rPr lang="en-US" sz="1800" dirty="0" smtClean="0"/>
-              <a:t>LFC</a:t>
-            </a:r>
-            <a:r>
-              <a:rPr lang="en-US" sz="1800" dirty="0" smtClean="0"/>
-              <a:t>: 4.78  </a:t>
+              <a:t>LFC: 4.78  </a:t>
             </a:r>
             <a:r>
               <a:rPr lang="en-US" sz="1800" dirty="0"/>
@@ -3793,23 +3784,15 @@
             </a:r>
             <a:r>
               <a:rPr lang="en-US" sz="1800" dirty="0" smtClean="0"/>
-              <a:t>: 5.03E-74 </a:t>
-            </a:r>
+              <a:t>: 5.03E-74 )</a:t>
+            </a:r>
+            <a:endParaRPr lang="en-US" sz="1800" dirty="0"/>
+          </a:p>
+          <a:p>
+            <a:pPr marL="742950" lvl="1" indent="-285750"/>
             <a:r>
               <a:rPr lang="en-US" sz="1800" dirty="0" smtClean="0"/>
-              <a:t>)</a:t>
-            </a:r>
-            <a:endParaRPr lang="en-US" sz="1800" dirty="0"/>
-          </a:p>
-          <a:p>
-            <a:pPr marL="742950" lvl="1" indent="-285750"/>
-            <a:r>
-              <a:rPr lang="en-US" sz="1800" dirty="0" smtClean="0"/>
-              <a:t>CAPG</a:t>
-            </a:r>
-            <a:r>
-              <a:rPr lang="en-US" sz="1800" dirty="0" smtClean="0"/>
-              <a:t> </a:t>
+              <a:t>CAPG </a:t>
             </a:r>
             <a:r>
               <a:rPr lang="en-US" sz="1800" dirty="0"/>
@@ -3817,11 +3800,7 @@
             </a:r>
             <a:r>
               <a:rPr lang="en-US" sz="1800" dirty="0" smtClean="0"/>
-              <a:t>5.59</a:t>
-            </a:r>
-            <a:r>
-              <a:rPr lang="en-US" sz="1800" dirty="0" smtClean="0"/>
-              <a:t>  </a:t>
+              <a:t>5.59  </a:t>
             </a:r>
             <a:r>
               <a:rPr lang="en-US" sz="1800" dirty="0"/>
@@ -3829,23 +3808,15 @@
             </a:r>
             <a:r>
               <a:rPr lang="en-US" sz="1800" dirty="0" smtClean="0"/>
-              <a:t>3.80E-72</a:t>
-            </a:r>
+              <a:t>3.80E-72)</a:t>
+            </a:r>
+            <a:endParaRPr lang="en-US" sz="1800" dirty="0"/>
+          </a:p>
+          <a:p>
+            <a:pPr marL="742950" lvl="1" indent="-285750"/>
             <a:r>
               <a:rPr lang="en-US" sz="1800" dirty="0" smtClean="0"/>
-              <a:t>)</a:t>
-            </a:r>
-            <a:endParaRPr lang="en-US" sz="1800" dirty="0"/>
-          </a:p>
-          <a:p>
-            <a:pPr marL="742950" lvl="1" indent="-285750"/>
-            <a:r>
-              <a:rPr lang="en-US" sz="1800" dirty="0" smtClean="0"/>
-              <a:t>RUNX2</a:t>
-            </a:r>
-            <a:r>
-              <a:rPr lang="en-US" sz="1800" dirty="0" smtClean="0"/>
-              <a:t> </a:t>
+              <a:t>RUNX2 </a:t>
             </a:r>
             <a:r>
               <a:rPr lang="en-US" sz="1800" dirty="0"/>
@@ -3853,11 +3824,7 @@
             </a:r>
             <a:r>
               <a:rPr lang="en-US" sz="1800" dirty="0" smtClean="0"/>
-              <a:t>4.57</a:t>
-            </a:r>
-            <a:r>
-              <a:rPr lang="en-US" sz="1800" dirty="0" smtClean="0"/>
-              <a:t>  </a:t>
+              <a:t>4.57  </a:t>
             </a:r>
             <a:r>
               <a:rPr lang="en-US" sz="1800" dirty="0"/>
@@ -3865,23 +3832,15 @@
             </a:r>
             <a:r>
               <a:rPr lang="en-US" sz="1800" dirty="0" smtClean="0"/>
-              <a:t>2.69E-66</a:t>
-            </a:r>
+              <a:t>2.69E-66)</a:t>
+            </a:r>
+            <a:endParaRPr lang="en-US" sz="1800" dirty="0"/>
+          </a:p>
+          <a:p>
+            <a:pPr marL="742950" lvl="1" indent="-285750"/>
             <a:r>
               <a:rPr lang="en-US" sz="1800" dirty="0" smtClean="0"/>
-              <a:t>)</a:t>
-            </a:r>
-            <a:endParaRPr lang="en-US" sz="1800" dirty="0"/>
-          </a:p>
-          <a:p>
-            <a:pPr marL="742950" lvl="1" indent="-285750"/>
-            <a:r>
-              <a:rPr lang="en-US" sz="1800" dirty="0" smtClean="0"/>
-              <a:t>TOP2A</a:t>
-            </a:r>
-            <a:r>
-              <a:rPr lang="en-US" sz="1800" dirty="0" smtClean="0"/>
-              <a:t> </a:t>
+              <a:t>TOP2A </a:t>
             </a:r>
             <a:r>
               <a:rPr lang="en-US" sz="1800" dirty="0"/>
@@ -3889,11 +3848,7 @@
             </a:r>
             <a:r>
               <a:rPr lang="en-US" sz="1800" dirty="0" smtClean="0"/>
-              <a:t>5.71</a:t>
-            </a:r>
-            <a:r>
-              <a:rPr lang="en-US" sz="1800" dirty="0" smtClean="0"/>
-              <a:t> </a:t>
+              <a:t>5.71 </a:t>
             </a:r>
             <a:r>
               <a:rPr lang="en-US" sz="1800" dirty="0"/>
@@ -3901,11 +3856,7 @@
             </a:r>
             <a:r>
               <a:rPr lang="en-US" sz="1800" dirty="0" smtClean="0"/>
-              <a:t>1.75E-59</a:t>
-            </a:r>
-            <a:r>
-              <a:rPr lang="en-US" sz="1800" dirty="0" smtClean="0"/>
-              <a:t>)</a:t>
+              <a:t>1.75E-59)</a:t>
             </a:r>
             <a:endParaRPr lang="en-US" sz="1800" dirty="0"/>
           </a:p>
@@ -3921,11 +3872,7 @@
             </a:r>
             <a:r>
               <a:rPr lang="en-US" sz="1800" dirty="0" smtClean="0"/>
-              <a:t>4.24</a:t>
-            </a:r>
-            <a:r>
-              <a:rPr lang="en-US" sz="1800" dirty="0" smtClean="0"/>
-              <a:t>, </a:t>
+              <a:t>4.24, </a:t>
             </a:r>
             <a:r>
               <a:rPr lang="en-US" sz="1800" dirty="0"/>
@@ -4038,6 +3985,208 @@
             <p:ph type="title"/>
           </p:nvPr>
         </p:nvSpPr>
+        <p:spPr/>
+        <p:txBody>
+          <a:bodyPr/>
+          <a:lstStyle/>
+          <a:p>
+            <a:r>
+              <a:rPr lang="en-US" dirty="0" smtClean="0"/>
+              <a:t>B vs A</a:t>
+            </a:r>
+            <a:r>
+              <a:rPr lang="en-US" dirty="0" smtClean="0"/>
+              <a:t>: </a:t>
+            </a:r>
+            <a:r>
+              <a:rPr lang="en-US" dirty="0" smtClean="0"/>
+              <a:t>Heat map</a:t>
+            </a:r>
+            <a:endParaRPr lang="en-US" dirty="0"/>
+          </a:p>
+        </p:txBody>
+      </p:sp>
+      <p:sp>
+        <p:nvSpPr>
+          <p:cNvPr id="5" name="TextBox 4"/>
+          <p:cNvSpPr txBox="1"/>
+          <p:nvPr/>
+        </p:nvSpPr>
+        <p:spPr>
+          <a:xfrm>
+            <a:off x="898071" y="2018792"/>
+            <a:ext cx="4726983" cy="4247317"/>
+          </a:xfrm>
+          <a:prstGeom prst="rect">
+            <a:avLst/>
+          </a:prstGeom>
+          <a:noFill/>
+        </p:spPr>
+        <p:txBody>
+          <a:bodyPr wrap="square" rtlCol="0">
+            <a:spAutoFit/>
+          </a:bodyPr>
+          <a:lstStyle/>
+          <a:p>
+            <a:pPr marL="285750" indent="-285750">
+              <a:buFont typeface="Arial" panose="020B0604020202020204" pitchFamily="34" charset="0"/>
+              <a:buChar char="•"/>
+            </a:pPr>
+            <a:r>
+              <a:rPr lang="en-US" dirty="0" smtClean="0"/>
+              <a:t>Color and intensity of the boxes represent changes of gene </a:t>
+            </a:r>
+            <a:r>
+              <a:rPr lang="en-US" dirty="0" smtClean="0"/>
+              <a:t>expression as quantified by row means of the normalized counts</a:t>
+            </a:r>
+          </a:p>
+          <a:p>
+            <a:pPr marL="285750" indent="-285750">
+              <a:buFont typeface="Arial" panose="020B0604020202020204" pitchFamily="34" charset="0"/>
+              <a:buChar char="•"/>
+            </a:pPr>
+            <a:r>
+              <a:rPr lang="en-US" dirty="0" smtClean="0"/>
+              <a:t>The genes listed are in decreasing order of the mean normalized counts across all samples</a:t>
+            </a:r>
+            <a:endParaRPr lang="en-US" dirty="0" smtClean="0"/>
+          </a:p>
+          <a:p>
+            <a:pPr marL="285750" indent="-285750">
+              <a:buFont typeface="Arial" panose="020B0604020202020204" pitchFamily="34" charset="0"/>
+              <a:buChar char="•"/>
+            </a:pPr>
+            <a:r>
+              <a:rPr lang="en-US" dirty="0" smtClean="0"/>
+              <a:t>Red indicates log fold changes close to </a:t>
+            </a:r>
+            <a:r>
+              <a:rPr lang="en-US" dirty="0" smtClean="0"/>
+              <a:t>16 </a:t>
+            </a:r>
+            <a:r>
+              <a:rPr lang="en-US" dirty="0" smtClean="0"/>
+              <a:t>and blue indicates log fold changes close to 8 </a:t>
+            </a:r>
+          </a:p>
+          <a:p>
+            <a:pPr marL="285750" indent="-285750">
+              <a:buFont typeface="Arial" panose="020B0604020202020204" pitchFamily="34" charset="0"/>
+              <a:buChar char="•"/>
+            </a:pPr>
+            <a:r>
+              <a:rPr lang="en-US" dirty="0" smtClean="0"/>
+              <a:t>Samples are grouped by </a:t>
+            </a:r>
+            <a:r>
+              <a:rPr lang="en-US" dirty="0" smtClean="0"/>
+              <a:t>dose group</a:t>
+            </a:r>
+            <a:r>
+              <a:rPr lang="en-US" dirty="0" smtClean="0"/>
+              <a:t> </a:t>
+            </a:r>
+            <a:r>
+              <a:rPr lang="en-US" dirty="0" smtClean="0"/>
+              <a:t>for simplified visual comparison and appear to have </a:t>
+            </a:r>
+            <a:r>
+              <a:rPr lang="en-US" dirty="0" smtClean="0"/>
+              <a:t>somewhat</a:t>
+            </a:r>
+            <a:r>
+              <a:rPr lang="en-US" dirty="0" smtClean="0"/>
+              <a:t> </a:t>
+            </a:r>
+            <a:r>
+              <a:rPr lang="en-US" dirty="0" smtClean="0"/>
+              <a:t>consistent expression within site groups</a:t>
+            </a:r>
+          </a:p>
+          <a:p>
+            <a:pPr marL="285750" indent="-285750">
+              <a:buFont typeface="Arial" panose="020B0604020202020204" pitchFamily="34" charset="0"/>
+              <a:buChar char="•"/>
+            </a:pPr>
+            <a:r>
+              <a:rPr lang="en-US" dirty="0" smtClean="0"/>
+              <a:t>As expected, both concentrations are more similar to one another than they are to concentration of 0 </a:t>
+            </a:r>
+            <a:endParaRPr lang="en-US" dirty="0"/>
+          </a:p>
+        </p:txBody>
+      </p:sp>
+      <p:pic>
+        <p:nvPicPr>
+          <p:cNvPr id="4" name="Picture 3"/>
+          <p:cNvPicPr>
+            <a:picLocks noChangeAspect="1"/>
+          </p:cNvPicPr>
+          <p:nvPr/>
+        </p:nvPicPr>
+        <p:blipFill>
+          <a:blip r:embed="rId2" cstate="print">
+            <a:extLst>
+              <a:ext uri="{28A0092B-C50C-407E-A947-70E740481C1C}">
+                <a14:useLocalDpi xmlns:a14="http://schemas.microsoft.com/office/drawing/2010/main" val="0"/>
+              </a:ext>
+            </a:extLst>
+          </a:blip>
+          <a:stretch>
+            <a:fillRect/>
+          </a:stretch>
+        </p:blipFill>
+        <p:spPr>
+          <a:xfrm>
+            <a:off x="6381744" y="767437"/>
+            <a:ext cx="5715012" cy="5715012"/>
+          </a:xfrm>
+          <a:prstGeom prst="rect">
+            <a:avLst/>
+          </a:prstGeom>
+        </p:spPr>
+      </p:pic>
+    </p:spTree>
+    <p:extLst>
+      <p:ext uri="{BB962C8B-B14F-4D97-AF65-F5344CB8AC3E}">
+        <p14:creationId xmlns:p14="http://schemas.microsoft.com/office/powerpoint/2010/main" val="27407585"/>
+      </p:ext>
+    </p:extLst>
+  </p:cSld>
+  <p:clrMapOvr>
+    <a:masterClrMapping/>
+  </p:clrMapOvr>
+</p:sld>
+</file>
+
+<file path=ppt/slides/slide15.xml><?xml version="1.0" encoding="utf-8"?>
+<p:sld xmlns:a="http://schemas.openxmlformats.org/drawingml/2006/main" xmlns:r="http://schemas.openxmlformats.org/officeDocument/2006/relationships" xmlns:p="http://schemas.openxmlformats.org/presentationml/2006/main">
+  <p:cSld>
+    <p:spTree>
+      <p:nvGrpSpPr>
+        <p:cNvPr id="1" name=""/>
+        <p:cNvGrpSpPr/>
+        <p:nvPr/>
+      </p:nvGrpSpPr>
+      <p:grpSpPr>
+        <a:xfrm>
+          <a:off x="0" y="0"/>
+          <a:ext cx="0" cy="0"/>
+          <a:chOff x="0" y="0"/>
+          <a:chExt cx="0" cy="0"/>
+        </a:xfrm>
+      </p:grpSpPr>
+      <p:sp>
+        <p:nvSpPr>
+          <p:cNvPr id="2" name="Title 1"/>
+          <p:cNvSpPr>
+            <a:spLocks noGrp="1"/>
+          </p:cNvSpPr>
+          <p:nvPr>
+            <p:ph type="title"/>
+          </p:nvPr>
+        </p:nvSpPr>
         <p:spPr>
           <a:xfrm>
             <a:off x="107175" y="239976"/>
@@ -4100,19 +4249,7 @@
             </a:r>
             <a:r>
               <a:rPr lang="en-US" sz="2000" dirty="0" smtClean="0"/>
-              <a:t>genes </a:t>
-            </a:r>
-            <a:r>
-              <a:rPr lang="en-US" sz="2000" dirty="0" smtClean="0"/>
-              <a:t>(</a:t>
-            </a:r>
-            <a:r>
-              <a:rPr lang="en-US" sz="2000" dirty="0" smtClean="0"/>
-              <a:t>5.7</a:t>
-            </a:r>
-            <a:r>
-              <a:rPr lang="en-US" sz="2000" dirty="0" smtClean="0"/>
-              <a:t>%)</a:t>
+              <a:t>genes (5.7%)</a:t>
             </a:r>
             <a:endParaRPr lang="en-US" sz="2000" dirty="0"/>
           </a:p>
@@ -4123,19 +4260,7 @@
             </a:pPr>
             <a:r>
               <a:rPr lang="en-US" sz="2000" dirty="0" smtClean="0"/>
-              <a:t>1116</a:t>
-            </a:r>
-            <a:r>
-              <a:rPr lang="en-US" sz="2000" dirty="0" smtClean="0"/>
-              <a:t> (</a:t>
-            </a:r>
-            <a:r>
-              <a:rPr lang="en-US" sz="2000" dirty="0" smtClean="0"/>
-              <a:t>4.4</a:t>
-            </a:r>
-            <a:r>
-              <a:rPr lang="en-US" sz="2000" dirty="0" smtClean="0"/>
-              <a:t>%) </a:t>
+              <a:t>1116 (4.4%) </a:t>
             </a:r>
             <a:r>
               <a:rPr lang="en-US" sz="2000" dirty="0"/>
@@ -4171,15 +4296,7 @@
             </a:pPr>
             <a:r>
               <a:rPr lang="en-US" sz="2000" dirty="0" smtClean="0"/>
-              <a:t>16066 </a:t>
-            </a:r>
-            <a:r>
-              <a:rPr lang="en-US" sz="2000" dirty="0" smtClean="0"/>
-              <a:t>(</a:t>
-            </a:r>
-            <a:r>
-              <a:rPr lang="en-US" sz="2000" dirty="0" smtClean="0"/>
-              <a:t>64%) </a:t>
+              <a:t>16066 (64%) </a:t>
             </a:r>
             <a:r>
               <a:rPr lang="en-US" sz="2000" dirty="0"/>
@@ -4292,7 +4409,7 @@
 </p:sld>
 </file>
 
-<file path=ppt/slides/slide15.xml><?xml version="1.0" encoding="utf-8"?>
+<file path=ppt/slides/slide16.xml><?xml version="1.0" encoding="utf-8"?>
 <p:sld xmlns:a="http://schemas.openxmlformats.org/drawingml/2006/main" xmlns:r="http://schemas.openxmlformats.org/officeDocument/2006/relationships" xmlns:p="http://schemas.openxmlformats.org/presentationml/2006/main">
   <p:cSld>
     <p:spTree>
@@ -4390,11 +4507,7 @@
             <a:pPr marL="742950" lvl="1" indent="-285750"/>
             <a:r>
               <a:rPr lang="en-US" sz="1800" dirty="0" smtClean="0"/>
-              <a:t>SRGAP</a:t>
-            </a:r>
-            <a:r>
-              <a:rPr lang="en-US" sz="1800" dirty="0" smtClean="0"/>
-              <a:t> </a:t>
+              <a:t>SRGAP </a:t>
             </a:r>
             <a:r>
               <a:rPr lang="en-US" sz="1800" dirty="0"/>
@@ -4410,11 +4523,7 @@
             </a:r>
             <a:r>
               <a:rPr lang="en-US" sz="1800" dirty="0" smtClean="0"/>
-              <a:t>8.57E-67</a:t>
-            </a:r>
-            <a:r>
-              <a:rPr lang="en-US" sz="1800" dirty="0" smtClean="0"/>
-              <a:t>)</a:t>
+              <a:t>8.57E-67)</a:t>
             </a:r>
             <a:endParaRPr lang="en-US" sz="1800" dirty="0"/>
           </a:p>
@@ -4430,11 +4539,7 @@
             </a:r>
             <a:r>
               <a:rPr lang="en-US" sz="1800" dirty="0" smtClean="0"/>
-              <a:t>5.09</a:t>
-            </a:r>
-            <a:r>
-              <a:rPr lang="en-US" sz="1800" dirty="0" smtClean="0"/>
-              <a:t>  </a:t>
+              <a:t>5.09  </a:t>
             </a:r>
             <a:r>
               <a:rPr lang="en-US" sz="1800" dirty="0"/>
@@ -4450,11 +4555,7 @@
             <a:pPr marL="742950" lvl="1" indent="-285750"/>
             <a:r>
               <a:rPr lang="en-US" sz="1800" dirty="0" smtClean="0"/>
-              <a:t>RUNX2</a:t>
-            </a:r>
-            <a:r>
-              <a:rPr lang="en-US" sz="1800" dirty="0" smtClean="0"/>
-              <a:t> </a:t>
+              <a:t>RUNX2 </a:t>
             </a:r>
             <a:r>
               <a:rPr lang="en-US" sz="1800" dirty="0"/>
@@ -4470,23 +4571,15 @@
             </a:r>
             <a:r>
               <a:rPr lang="en-US" sz="1800" dirty="0" smtClean="0"/>
-              <a:t>1.46E-61</a:t>
-            </a:r>
+              <a:t>1.46E-61)</a:t>
+            </a:r>
+            <a:endParaRPr lang="en-US" sz="1800" dirty="0"/>
+          </a:p>
+          <a:p>
+            <a:pPr marL="742950" lvl="1" indent="-285750"/>
             <a:r>
               <a:rPr lang="en-US" sz="1800" dirty="0" smtClean="0"/>
-              <a:t>)</a:t>
-            </a:r>
-            <a:endParaRPr lang="en-US" sz="1800" dirty="0"/>
-          </a:p>
-          <a:p>
-            <a:pPr marL="742950" lvl="1" indent="-285750"/>
-            <a:r>
-              <a:rPr lang="en-US" sz="1800" dirty="0" smtClean="0"/>
-              <a:t>SPRY2</a:t>
-            </a:r>
-            <a:r>
-              <a:rPr lang="en-US" sz="1800" dirty="0" smtClean="0"/>
-              <a:t> </a:t>
+              <a:t>SPRY2 </a:t>
             </a:r>
             <a:r>
               <a:rPr lang="en-US" sz="1800" dirty="0"/>
@@ -4494,11 +4587,7 @@
             </a:r>
             <a:r>
               <a:rPr lang="en-US" sz="1800" dirty="0" smtClean="0"/>
-              <a:t>6.11</a:t>
-            </a:r>
-            <a:r>
-              <a:rPr lang="en-US" sz="1800" dirty="0" smtClean="0"/>
-              <a:t> </a:t>
+              <a:t>6.11 </a:t>
             </a:r>
             <a:r>
               <a:rPr lang="en-US" sz="1800" dirty="0"/>
@@ -4514,11 +4603,7 @@
             <a:pPr marL="742950" lvl="1" indent="-285750"/>
             <a:r>
               <a:rPr lang="en-US" sz="1800" dirty="0" smtClean="0"/>
-              <a:t>AHNAK</a:t>
-            </a:r>
-            <a:r>
-              <a:rPr lang="en-US" sz="1800" dirty="0" smtClean="0"/>
-              <a:t> </a:t>
+              <a:t>AHNAK </a:t>
             </a:r>
             <a:r>
               <a:rPr lang="en-US" sz="1800" dirty="0"/>
@@ -4526,11 +4611,7 @@
             </a:r>
             <a:r>
               <a:rPr lang="en-US" sz="1800" dirty="0" smtClean="0"/>
-              <a:t>5.31</a:t>
-            </a:r>
-            <a:r>
-              <a:rPr lang="en-US" sz="1800" dirty="0" smtClean="0"/>
-              <a:t>, </a:t>
+              <a:t>5.31, </a:t>
             </a:r>
             <a:r>
               <a:rPr lang="en-US" sz="1800" dirty="0"/>
@@ -4538,11 +4619,7 @@
             </a:r>
             <a:r>
               <a:rPr lang="en-US" sz="1800" dirty="0" smtClean="0"/>
-              <a:t>1.51E-53</a:t>
-            </a:r>
-            <a:r>
-              <a:rPr lang="en-US" sz="1800" dirty="0" smtClean="0"/>
-              <a:t>) </a:t>
+              <a:t>1.51E-53) </a:t>
             </a:r>
             <a:endParaRPr lang="en-US" sz="1800" dirty="0"/>
           </a:p>
@@ -4612,7 +4689,7 @@
 </p:sld>
 </file>
 
-<file path=ppt/slides/slide16.xml><?xml version="1.0" encoding="utf-8"?>
+<file path=ppt/slides/slide17.xml><?xml version="1.0" encoding="utf-8"?>
 <p:sld xmlns:a="http://schemas.openxmlformats.org/drawingml/2006/main" xmlns:r="http://schemas.openxmlformats.org/officeDocument/2006/relationships" xmlns:p="http://schemas.openxmlformats.org/presentationml/2006/main">
   <p:cSld>
     <p:spTree>
@@ -4639,6 +4716,212 @@
             <p:ph type="title"/>
           </p:nvPr>
         </p:nvSpPr>
+        <p:spPr/>
+        <p:txBody>
+          <a:bodyPr/>
+          <a:lstStyle/>
+          <a:p>
+            <a:r>
+              <a:rPr lang="en-US" dirty="0"/>
+              <a:t>C</a:t>
+            </a:r>
+            <a:r>
+              <a:rPr lang="en-US" dirty="0" smtClean="0"/>
+              <a:t> vs A</a:t>
+            </a:r>
+            <a:r>
+              <a:rPr lang="en-US" dirty="0" smtClean="0"/>
+              <a:t>: </a:t>
+            </a:r>
+            <a:r>
+              <a:rPr lang="en-US" dirty="0" smtClean="0"/>
+              <a:t>Heat map</a:t>
+            </a:r>
+            <a:endParaRPr lang="en-US" dirty="0"/>
+          </a:p>
+        </p:txBody>
+      </p:sp>
+      <p:sp>
+        <p:nvSpPr>
+          <p:cNvPr id="5" name="TextBox 4"/>
+          <p:cNvSpPr txBox="1"/>
+          <p:nvPr/>
+        </p:nvSpPr>
+        <p:spPr>
+          <a:xfrm>
+            <a:off x="898071" y="2018792"/>
+            <a:ext cx="4726983" cy="4247317"/>
+          </a:xfrm>
+          <a:prstGeom prst="rect">
+            <a:avLst/>
+          </a:prstGeom>
+          <a:noFill/>
+        </p:spPr>
+        <p:txBody>
+          <a:bodyPr wrap="square" rtlCol="0">
+            <a:spAutoFit/>
+          </a:bodyPr>
+          <a:lstStyle/>
+          <a:p>
+            <a:pPr marL="285750" indent="-285750">
+              <a:buFont typeface="Arial" panose="020B0604020202020204" pitchFamily="34" charset="0"/>
+              <a:buChar char="•"/>
+            </a:pPr>
+            <a:r>
+              <a:rPr lang="en-US" dirty="0" smtClean="0"/>
+              <a:t>Color and intensity of the boxes represent changes of gene </a:t>
+            </a:r>
+            <a:r>
+              <a:rPr lang="en-US" dirty="0" smtClean="0"/>
+              <a:t>expression as quantified by row means of the normalized counts</a:t>
+            </a:r>
+          </a:p>
+          <a:p>
+            <a:pPr marL="285750" indent="-285750">
+              <a:buFont typeface="Arial" panose="020B0604020202020204" pitchFamily="34" charset="0"/>
+              <a:buChar char="•"/>
+            </a:pPr>
+            <a:r>
+              <a:rPr lang="en-US" dirty="0" smtClean="0"/>
+              <a:t>The genes listed are in decreasing order of the mean normalized counts across all samples</a:t>
+            </a:r>
+            <a:endParaRPr lang="en-US" dirty="0" smtClean="0"/>
+          </a:p>
+          <a:p>
+            <a:pPr marL="285750" indent="-285750">
+              <a:buFont typeface="Arial" panose="020B0604020202020204" pitchFamily="34" charset="0"/>
+              <a:buChar char="•"/>
+            </a:pPr>
+            <a:r>
+              <a:rPr lang="en-US" dirty="0" smtClean="0"/>
+              <a:t>Red indicates log fold changes close to </a:t>
+            </a:r>
+            <a:r>
+              <a:rPr lang="en-US" dirty="0" smtClean="0"/>
+              <a:t>16 </a:t>
+            </a:r>
+            <a:r>
+              <a:rPr lang="en-US" dirty="0" smtClean="0"/>
+              <a:t>and blue indicates log fold changes close to 8 </a:t>
+            </a:r>
+          </a:p>
+          <a:p>
+            <a:pPr marL="285750" indent="-285750">
+              <a:buFont typeface="Arial" panose="020B0604020202020204" pitchFamily="34" charset="0"/>
+              <a:buChar char="•"/>
+            </a:pPr>
+            <a:r>
+              <a:rPr lang="en-US" dirty="0" smtClean="0"/>
+              <a:t>Samples are grouped by </a:t>
+            </a:r>
+            <a:r>
+              <a:rPr lang="en-US" dirty="0" smtClean="0"/>
+              <a:t>dose group</a:t>
+            </a:r>
+            <a:r>
+              <a:rPr lang="en-US" dirty="0" smtClean="0"/>
+              <a:t> </a:t>
+            </a:r>
+            <a:r>
+              <a:rPr lang="en-US" dirty="0" smtClean="0"/>
+              <a:t>for simplified visual comparison and appear to have </a:t>
+            </a:r>
+            <a:r>
+              <a:rPr lang="en-US" dirty="0" smtClean="0"/>
+              <a:t>somewhat</a:t>
+            </a:r>
+            <a:r>
+              <a:rPr lang="en-US" dirty="0" smtClean="0"/>
+              <a:t> </a:t>
+            </a:r>
+            <a:r>
+              <a:rPr lang="en-US" dirty="0" smtClean="0"/>
+              <a:t>consistent expression within site groups</a:t>
+            </a:r>
+          </a:p>
+          <a:p>
+            <a:pPr marL="285750" indent="-285750">
+              <a:buFont typeface="Arial" panose="020B0604020202020204" pitchFamily="34" charset="0"/>
+              <a:buChar char="•"/>
+            </a:pPr>
+            <a:r>
+              <a:rPr lang="en-US" dirty="0" smtClean="0"/>
+              <a:t>As expected, both concentrations are more similar to one another than they are to concentration of 0 </a:t>
+            </a:r>
+            <a:endParaRPr lang="en-US" dirty="0"/>
+          </a:p>
+        </p:txBody>
+      </p:sp>
+      <p:pic>
+        <p:nvPicPr>
+          <p:cNvPr id="4" name="Picture 3"/>
+          <p:cNvPicPr>
+            <a:picLocks noChangeAspect="1"/>
+          </p:cNvPicPr>
+          <p:nvPr/>
+        </p:nvPicPr>
+        <p:blipFill>
+          <a:blip r:embed="rId2" cstate="print">
+            <a:extLst>
+              <a:ext uri="{28A0092B-C50C-407E-A947-70E740481C1C}">
+                <a14:useLocalDpi xmlns:a14="http://schemas.microsoft.com/office/drawing/2010/main" val="0"/>
+              </a:ext>
+            </a:extLst>
+          </a:blip>
+          <a:stretch>
+            <a:fillRect/>
+          </a:stretch>
+        </p:blipFill>
+        <p:spPr>
+          <a:xfrm>
+            <a:off x="6259280" y="816422"/>
+            <a:ext cx="5715012" cy="5715012"/>
+          </a:xfrm>
+          <a:prstGeom prst="rect">
+            <a:avLst/>
+          </a:prstGeom>
+        </p:spPr>
+      </p:pic>
+    </p:spTree>
+    <p:extLst>
+      <p:ext uri="{BB962C8B-B14F-4D97-AF65-F5344CB8AC3E}">
+        <p14:creationId xmlns:p14="http://schemas.microsoft.com/office/powerpoint/2010/main" val="3963905637"/>
+      </p:ext>
+    </p:extLst>
+  </p:cSld>
+  <p:clrMapOvr>
+    <a:masterClrMapping/>
+  </p:clrMapOvr>
+</p:sld>
+</file>
+
+<file path=ppt/slides/slide18.xml><?xml version="1.0" encoding="utf-8"?>
+<p:sld xmlns:a="http://schemas.openxmlformats.org/drawingml/2006/main" xmlns:r="http://schemas.openxmlformats.org/officeDocument/2006/relationships" xmlns:p="http://schemas.openxmlformats.org/presentationml/2006/main">
+  <p:cSld>
+    <p:spTree>
+      <p:nvGrpSpPr>
+        <p:cNvPr id="1" name=""/>
+        <p:cNvGrpSpPr/>
+        <p:nvPr/>
+      </p:nvGrpSpPr>
+      <p:grpSpPr>
+        <a:xfrm>
+          <a:off x="0" y="0"/>
+          <a:ext cx="0" cy="0"/>
+          <a:chOff x="0" y="0"/>
+          <a:chExt cx="0" cy="0"/>
+        </a:xfrm>
+      </p:grpSpPr>
+      <p:sp>
+        <p:nvSpPr>
+          <p:cNvPr id="2" name="Title 1"/>
+          <p:cNvSpPr>
+            <a:spLocks noGrp="1"/>
+          </p:cNvSpPr>
+          <p:nvPr>
+            <p:ph type="title"/>
+          </p:nvPr>
+        </p:nvSpPr>
         <p:spPr>
           <a:xfrm>
             <a:off x="107175" y="239976"/>
@@ -4689,7 +4972,6 @@
               <a:rPr lang="en-US" sz="2000" dirty="0" smtClean="0"/>
               <a:t>0.01 </a:t>
             </a:r>
-            <a:endParaRPr lang="en-US" sz="2000" dirty="0" smtClean="0"/>
           </a:p>
           <a:p>
             <a:pPr marL="342900" indent="-342900">
@@ -4698,19 +4980,7 @@
             </a:pPr>
             <a:r>
               <a:rPr lang="en-US" sz="2000" dirty="0" smtClean="0"/>
-              <a:t>67 </a:t>
-            </a:r>
-            <a:r>
-              <a:rPr lang="en-US" sz="2000" dirty="0" smtClean="0"/>
-              <a:t>DE </a:t>
-            </a:r>
-            <a:r>
-              <a:rPr lang="en-US" sz="2000" dirty="0" smtClean="0"/>
-              <a:t>genes (0.48</a:t>
-            </a:r>
-            <a:r>
-              <a:rPr lang="en-US" sz="2000" dirty="0" smtClean="0"/>
-              <a:t>%)</a:t>
+              <a:t>67 DE genes (0.48%)</a:t>
             </a:r>
             <a:endParaRPr lang="en-US" sz="2000" dirty="0"/>
           </a:p>
@@ -4721,11 +4991,7 @@
             </a:pPr>
             <a:r>
               <a:rPr lang="en-US" sz="2000" dirty="0" smtClean="0"/>
-              <a:t>73 </a:t>
-            </a:r>
-            <a:r>
-              <a:rPr lang="en-US" sz="2000" dirty="0" smtClean="0"/>
-              <a:t>(0.289%) </a:t>
+              <a:t>73 (0.289%) </a:t>
             </a:r>
             <a:r>
               <a:rPr lang="en-US" sz="2000" dirty="0"/>
@@ -4743,15 +5009,7 @@
             </a:pPr>
             <a:r>
               <a:rPr lang="en-US" sz="2000" dirty="0" smtClean="0"/>
-              <a:t>48  </a:t>
-            </a:r>
-            <a:r>
-              <a:rPr lang="en-US" sz="2000" dirty="0" smtClean="0"/>
-              <a:t>(0.194%)  down </a:t>
-            </a:r>
-            <a:r>
-              <a:rPr lang="en-US" sz="2000" dirty="0" smtClean="0"/>
-              <a:t>regulated</a:t>
+              <a:t>48  (0.194%)  down regulated</a:t>
             </a:r>
           </a:p>
           <a:p>
@@ -4767,7 +5025,6 @@
               <a:rPr lang="en-US" sz="1800" dirty="0" smtClean="0"/>
               <a:t>for mean normalized counts &lt;6</a:t>
             </a:r>
-            <a:endParaRPr lang="en-US" sz="1800" dirty="0" smtClean="0"/>
           </a:p>
           <a:p>
             <a:pPr marL="342900" lvl="1" indent="-342900">
@@ -4802,11 +5059,7 @@
             </a:pPr>
             <a:r>
               <a:rPr lang="en-US" sz="2000" dirty="0" smtClean="0"/>
-              <a:t>MA </a:t>
-            </a:r>
-            <a:r>
-              <a:rPr lang="en-US" sz="2000" dirty="0" smtClean="0"/>
-              <a:t>plot (pre-threshold)</a:t>
+              <a:t>MA plot (pre-threshold)</a:t>
             </a:r>
             <a:endParaRPr lang="en-US" sz="2000" dirty="0"/>
           </a:p>
@@ -4886,7 +5139,7 @@
 </p:sld>
 </file>
 
-<file path=ppt/slides/slide17.xml><?xml version="1.0" encoding="utf-8"?>
+<file path=ppt/slides/slide19.xml><?xml version="1.0" encoding="utf-8"?>
 <p:sld xmlns:a="http://schemas.openxmlformats.org/drawingml/2006/main" xmlns:r="http://schemas.openxmlformats.org/officeDocument/2006/relationships" xmlns:p="http://schemas.openxmlformats.org/presentationml/2006/main">
   <p:cSld>
     <p:spTree>
@@ -4995,11 +5248,7 @@
             <a:pPr marL="1200150" lvl="2" indent="-285750"/>
             <a:r>
               <a:rPr lang="en-US" sz="1600" dirty="0" smtClean="0"/>
-              <a:t>ACT2</a:t>
-            </a:r>
-            <a:r>
-              <a:rPr lang="en-US" sz="1600" dirty="0" smtClean="0"/>
-              <a:t> </a:t>
+              <a:t>ACT2 </a:t>
             </a:r>
             <a:r>
               <a:rPr lang="en-US" sz="1600" dirty="0"/>
@@ -5007,11 +5256,7 @@
             </a:r>
             <a:r>
               <a:rPr lang="en-US" sz="1600" dirty="0" smtClean="0"/>
-              <a:t>LFC</a:t>
-            </a:r>
-            <a:r>
-              <a:rPr lang="en-US" sz="1600" dirty="0" smtClean="0"/>
-              <a:t>:-3.34, </a:t>
+              <a:t>LFC:-3.34, </a:t>
             </a:r>
             <a:r>
               <a:rPr lang="en-US" sz="1600" dirty="0"/>
@@ -5019,23 +5264,15 @@
             </a:r>
             <a:r>
               <a:rPr lang="en-US" sz="1600" dirty="0" smtClean="0"/>
-              <a:t>6.77E-13</a:t>
-            </a:r>
+              <a:t>6.77E-13)</a:t>
+            </a:r>
+            <a:endParaRPr lang="en-US" sz="1600" dirty="0"/>
+          </a:p>
+          <a:p>
+            <a:pPr marL="1200150" lvl="2" indent="-285750"/>
             <a:r>
               <a:rPr lang="en-US" sz="1600" dirty="0" smtClean="0"/>
-              <a:t>)</a:t>
-            </a:r>
-            <a:endParaRPr lang="en-US" sz="1600" dirty="0"/>
-          </a:p>
-          <a:p>
-            <a:pPr marL="1200150" lvl="2" indent="-285750"/>
-            <a:r>
-              <a:rPr lang="en-US" sz="1600" dirty="0" smtClean="0"/>
-              <a:t>KIF11</a:t>
-            </a:r>
-            <a:r>
-              <a:rPr lang="en-US" sz="1600" dirty="0" smtClean="0"/>
-              <a:t>(LFC</a:t>
+              <a:t>KIF11(LFC</a:t>
             </a:r>
             <a:r>
               <a:rPr lang="en-US" sz="1600" dirty="0"/>
@@ -5043,11 +5280,7 @@
             </a:r>
             <a:r>
               <a:rPr lang="en-US" sz="1600" dirty="0" smtClean="0"/>
-              <a:t>-2.61</a:t>
-            </a:r>
-            <a:r>
-              <a:rPr lang="en-US" sz="1600" dirty="0" smtClean="0"/>
-              <a:t>, </a:t>
+              <a:t>-2.61, </a:t>
             </a:r>
             <a:r>
               <a:rPr lang="en-US" sz="1600" dirty="0"/>
@@ -5055,23 +5288,15 @@
             </a:r>
             <a:r>
               <a:rPr lang="en-US" sz="1600" dirty="0" smtClean="0"/>
-              <a:t>2.63E-08</a:t>
-            </a:r>
+              <a:t>2.63E-08)</a:t>
+            </a:r>
+            <a:endParaRPr lang="en-US" sz="1600" dirty="0"/>
+          </a:p>
+          <a:p>
+            <a:pPr marL="1200150" lvl="2" indent="-285750"/>
             <a:r>
               <a:rPr lang="en-US" sz="1600" dirty="0" smtClean="0"/>
-              <a:t>)</a:t>
-            </a:r>
-            <a:endParaRPr lang="en-US" sz="1600" dirty="0"/>
-          </a:p>
-          <a:p>
-            <a:pPr marL="1200150" lvl="2" indent="-285750"/>
-            <a:r>
-              <a:rPr lang="en-US" sz="1600" dirty="0" smtClean="0"/>
-              <a:t>APH1A </a:t>
-            </a:r>
-            <a:r>
-              <a:rPr lang="en-US" sz="1600" dirty="0" smtClean="0"/>
-              <a:t>(LFC: 2.70, </a:t>
+              <a:t>APH1A (LFC: 2.70, </a:t>
             </a:r>
             <a:r>
               <a:rPr lang="en-US" sz="1600" dirty="0"/>
@@ -5079,23 +5304,15 @@
             </a:r>
             <a:r>
               <a:rPr lang="en-US" sz="1600" dirty="0" smtClean="0"/>
-              <a:t>4.76E-08</a:t>
-            </a:r>
+              <a:t>4.76E-08)</a:t>
+            </a:r>
+            <a:endParaRPr lang="en-US" sz="1600" dirty="0"/>
+          </a:p>
+          <a:p>
+            <a:pPr marL="1200150" lvl="2" indent="-285750"/>
             <a:r>
               <a:rPr lang="en-US" sz="1600" dirty="0" smtClean="0"/>
-              <a:t>)</a:t>
-            </a:r>
-            <a:endParaRPr lang="en-US" sz="1600" dirty="0"/>
-          </a:p>
-          <a:p>
-            <a:pPr marL="1200150" lvl="2" indent="-285750"/>
-            <a:r>
-              <a:rPr lang="en-US" sz="1600" dirty="0" smtClean="0"/>
-              <a:t>ATP2B2</a:t>
-            </a:r>
-            <a:r>
-              <a:rPr lang="en-US" sz="1600" dirty="0" smtClean="0"/>
-              <a:t>(LFC</a:t>
+              <a:t>ATP2B2(LFC</a:t>
             </a:r>
             <a:r>
               <a:rPr lang="en-US" sz="1600" dirty="0"/>
@@ -5103,11 +5320,7 @@
             </a:r>
             <a:r>
               <a:rPr lang="en-US" sz="1600" dirty="0" smtClean="0"/>
-              <a:t>3.52</a:t>
-            </a:r>
-            <a:r>
-              <a:rPr lang="en-US" sz="1600" dirty="0" smtClean="0"/>
-              <a:t>, </a:t>
+              <a:t>3.52, </a:t>
             </a:r>
             <a:r>
               <a:rPr lang="en-US" sz="1600" dirty="0"/>
@@ -5115,23 +5328,15 @@
             </a:r>
             <a:r>
               <a:rPr lang="en-US" sz="1600" dirty="0" smtClean="0"/>
-              <a:t>4.76E-08</a:t>
-            </a:r>
+              <a:t>4.76E-08)</a:t>
+            </a:r>
+            <a:endParaRPr lang="en-US" sz="1600" dirty="0"/>
+          </a:p>
+          <a:p>
+            <a:pPr marL="1200150" lvl="2" indent="-285750"/>
             <a:r>
               <a:rPr lang="en-US" sz="1600" dirty="0" smtClean="0"/>
-              <a:t>)</a:t>
-            </a:r>
-            <a:endParaRPr lang="en-US" sz="1600" dirty="0"/>
-          </a:p>
-          <a:p>
-            <a:pPr marL="1200150" lvl="2" indent="-285750"/>
-            <a:r>
-              <a:rPr lang="en-US" sz="1600" dirty="0" smtClean="0"/>
-              <a:t>E2F3</a:t>
-            </a:r>
-            <a:r>
-              <a:rPr lang="en-US" sz="1600" dirty="0" smtClean="0"/>
-              <a:t>(LFC</a:t>
+              <a:t>E2F3(LFC</a:t>
             </a:r>
             <a:r>
               <a:rPr lang="en-US" sz="1600" dirty="0"/>
@@ -5139,25 +5344,12 @@
             </a:r>
             <a:r>
               <a:rPr lang="en-US" sz="1600" dirty="0" smtClean="0"/>
-              <a:t>-</a:t>
-            </a:r>
-            <a:r>
-              <a:rPr lang="en-US" sz="1600" dirty="0" smtClean="0"/>
-              <a:t>2.32</a:t>
-            </a:r>
-            <a:r>
-              <a:rPr lang="en-US" sz="1600" dirty="0" smtClean="0"/>
-              <a:t>, </a:t>
+              <a:t>-2.32, </a:t>
             </a:r>
             <a:r>
               <a:rPr lang="en-US" sz="1600" dirty="0"/>
-              <a:t>FDR: </a:t>
-            </a:r>
-            <a:r>
-              <a:rPr lang="en-US" sz="1600" dirty="0"/>
-              <a:t>4.76E-08)</a:t>
-            </a:r>
-            <a:endParaRPr lang="en-US" sz="1600" dirty="0"/>
+              <a:t>FDR: 4.76E-08)</a:t>
+            </a:r>
           </a:p>
           <a:p>
             <a:pPr marL="285750" indent="-285750">
@@ -5166,39 +5358,7 @@
             </a:pPr>
             <a:r>
               <a:rPr lang="en-US" sz="1800" dirty="0" smtClean="0"/>
-              <a:t>Note </a:t>
-            </a:r>
-            <a:r>
-              <a:rPr lang="en-US" sz="1800" dirty="0" smtClean="0"/>
-              <a:t>that the x axis is </a:t>
-            </a:r>
-            <a:r>
-              <a:rPr lang="en-US" sz="1800" dirty="0" smtClean="0"/>
-              <a:t>~ </a:t>
-            </a:r>
-            <a:r>
-              <a:rPr lang="en-US" sz="1800" dirty="0" smtClean="0"/>
-              <a:t>1/4</a:t>
-            </a:r>
-            <a:r>
-              <a:rPr lang="en-US" sz="1800" dirty="0" smtClean="0"/>
-              <a:t> of </a:t>
-            </a:r>
-            <a:r>
-              <a:rPr lang="en-US" sz="1800" dirty="0" smtClean="0"/>
-              <a:t>previous Volcano </a:t>
-            </a:r>
-            <a:r>
-              <a:rPr lang="en-US" sz="1800" dirty="0" smtClean="0"/>
-              <a:t>plots suggesting much smaller differences in </a:t>
-            </a:r>
-            <a:r>
-              <a:rPr lang="en-US" sz="1800" dirty="0" smtClean="0"/>
-              <a:t>LFC </a:t>
-            </a:r>
-            <a:r>
-              <a:rPr lang="en-US" sz="1800" dirty="0" smtClean="0"/>
-              <a:t>between groups</a:t>
+              <a:t>Note that the x axis is ~ 1/4 of previous Volcano plots suggesting much smaller differences in LFC between groups</a:t>
             </a:r>
             <a:endParaRPr lang="en-US" sz="1800" dirty="0"/>
           </a:p>
@@ -5257,7 +5417,7 @@
 </p:sld>
 </file>
 
-<file path=ppt/slides/slide18.xml><?xml version="1.0" encoding="utf-8"?>
+<file path=ppt/slides/slide2.xml><?xml version="1.0" encoding="utf-8"?>
 <p:sld xmlns:a="http://schemas.openxmlformats.org/drawingml/2006/main" xmlns:r="http://schemas.openxmlformats.org/officeDocument/2006/relationships" xmlns:p="http://schemas.openxmlformats.org/presentationml/2006/main">
   <p:cSld>
     <p:spTree>
@@ -5276,6 +5436,501 @@
       </p:grpSpPr>
       <p:sp>
         <p:nvSpPr>
+          <p:cNvPr id="2" name="Title 1">
+            <a:extLst>
+              <a:ext uri="{FF2B5EF4-FFF2-40B4-BE49-F238E27FC236}">
+                <a16:creationId xmlns:a16="http://schemas.microsoft.com/office/drawing/2014/main" id="{3A2D132A-48CD-CA44-9040-8CD5E5DD4DEB}"/>
+              </a:ext>
+            </a:extLst>
+          </p:cNvPr>
+          <p:cNvSpPr>
+            <a:spLocks noGrp="1"/>
+          </p:cNvSpPr>
+          <p:nvPr>
+            <p:ph type="title"/>
+          </p:nvPr>
+        </p:nvSpPr>
+        <p:spPr/>
+        <p:txBody>
+          <a:bodyPr/>
+          <a:lstStyle/>
+          <a:p>
+            <a:r>
+              <a:rPr lang="en-US" dirty="0" err="1"/>
+              <a:t>RNASeq</a:t>
+            </a:r>
+            <a:r>
+              <a:rPr lang="en-US" dirty="0"/>
+              <a:t> Analysis Workflow</a:t>
+            </a:r>
+          </a:p>
+        </p:txBody>
+      </p:sp>
+      <p:sp>
+        <p:nvSpPr>
+          <p:cNvPr id="3" name="Content Placeholder 2">
+            <a:extLst>
+              <a:ext uri="{FF2B5EF4-FFF2-40B4-BE49-F238E27FC236}">
+                <a16:creationId xmlns:a16="http://schemas.microsoft.com/office/drawing/2014/main" id="{BC867114-6E4A-F345-9EBB-6E085C92DE33}"/>
+              </a:ext>
+            </a:extLst>
+          </p:cNvPr>
+          <p:cNvSpPr>
+            <a:spLocks noGrp="1"/>
+          </p:cNvSpPr>
+          <p:nvPr>
+            <p:ph idx="1"/>
+          </p:nvPr>
+        </p:nvSpPr>
+        <p:spPr/>
+        <p:txBody>
+          <a:bodyPr>
+            <a:normAutofit fontScale="92500" lnSpcReduction="20000"/>
+          </a:bodyPr>
+          <a:lstStyle/>
+          <a:p>
+            <a:pPr marL="571500" indent="-571500">
+              <a:buFont typeface="+mj-lt"/>
+              <a:buAutoNum type="romanUcPeriod"/>
+            </a:pPr>
+            <a:r>
+              <a:rPr lang="en-US" dirty="0"/>
+              <a:t>QC at .</a:t>
+            </a:r>
+            <a:r>
+              <a:rPr lang="en-US" dirty="0" err="1"/>
+              <a:t>fastq</a:t>
+            </a:r>
+            <a:r>
+              <a:rPr lang="en-US" dirty="0"/>
+              <a:t> stage</a:t>
+            </a:r>
+          </a:p>
+          <a:p>
+            <a:pPr marL="1028700" lvl="1" indent="-571500">
+              <a:buFont typeface="+mj-lt"/>
+              <a:buAutoNum type="romanUcPeriod"/>
+            </a:pPr>
+            <a:r>
+              <a:rPr lang="en-US" dirty="0" err="1"/>
+              <a:t>FastQC</a:t>
+            </a:r>
+            <a:r>
+              <a:rPr lang="en-US" dirty="0"/>
+              <a:t> , </a:t>
+            </a:r>
+            <a:r>
+              <a:rPr lang="en-US" dirty="0" err="1"/>
+              <a:t>Fastq</a:t>
+            </a:r>
+            <a:r>
+              <a:rPr lang="en-US" dirty="0"/>
+              <a:t>-Screen, </a:t>
+            </a:r>
+            <a:r>
+              <a:rPr lang="en-US" dirty="0" err="1"/>
+              <a:t>MultiQC</a:t>
+            </a:r>
+            <a:r>
+              <a:rPr lang="en-US" dirty="0"/>
+              <a:t>, &amp; </a:t>
+            </a:r>
+            <a:r>
+              <a:rPr lang="en-US" dirty="0" err="1"/>
+              <a:t>Trimmomatic</a:t>
+            </a:r>
+            <a:r>
+              <a:rPr lang="en-US" dirty="0"/>
+              <a:t> if necessary</a:t>
+            </a:r>
+          </a:p>
+          <a:p>
+            <a:pPr marL="571500" indent="-571500">
+              <a:buFont typeface="+mj-lt"/>
+              <a:buAutoNum type="romanUcPeriod"/>
+            </a:pPr>
+            <a:r>
+              <a:rPr lang="en-US" dirty="0"/>
+              <a:t>Alignment to reference genome </a:t>
+            </a:r>
+          </a:p>
+          <a:p>
+            <a:pPr marL="1028700" lvl="1" indent="-571500">
+              <a:buFont typeface="+mj-lt"/>
+              <a:buAutoNum type="romanUcPeriod"/>
+            </a:pPr>
+            <a:r>
+              <a:rPr lang="en-US" dirty="0"/>
+              <a:t>STAR – mm10 genome for </a:t>
+            </a:r>
+            <a:r>
+              <a:rPr lang="en-US" i="1" dirty="0"/>
+              <a:t>M. musculus</a:t>
+            </a:r>
+            <a:r>
+              <a:rPr lang="en-US" dirty="0"/>
+              <a:t>, UCSC</a:t>
+            </a:r>
+          </a:p>
+          <a:p>
+            <a:pPr marL="1028700" lvl="1" indent="-571500">
+              <a:buFont typeface="+mj-lt"/>
+              <a:buAutoNum type="romanUcPeriod"/>
+            </a:pPr>
+            <a:r>
+              <a:rPr lang="en-US" dirty="0"/>
+              <a:t>Sort and index .bam files</a:t>
+            </a:r>
+          </a:p>
+          <a:p>
+            <a:pPr marL="571500" indent="-571500">
+              <a:buFont typeface="+mj-lt"/>
+              <a:buAutoNum type="romanUcPeriod"/>
+            </a:pPr>
+            <a:r>
+              <a:rPr lang="en-US" dirty="0"/>
+              <a:t>Generation of raw counts from alignment .bam files</a:t>
+            </a:r>
+          </a:p>
+          <a:p>
+            <a:pPr marL="1028700" lvl="1" indent="-571500">
+              <a:buFont typeface="+mj-lt"/>
+              <a:buAutoNum type="romanUcPeriod"/>
+            </a:pPr>
+            <a:r>
+              <a:rPr lang="en-US" dirty="0" err="1"/>
+              <a:t>HTSeq</a:t>
+            </a:r>
+            <a:endParaRPr lang="en-US" dirty="0"/>
+          </a:p>
+          <a:p>
+            <a:pPr marL="571500" indent="-571500">
+              <a:buFont typeface="+mj-lt"/>
+              <a:buAutoNum type="romanUcPeriod"/>
+            </a:pPr>
+            <a:r>
+              <a:rPr lang="en-US" dirty="0"/>
+              <a:t>Differential Expression Analysis</a:t>
+            </a:r>
+          </a:p>
+          <a:p>
+            <a:pPr marL="1028700" lvl="1" indent="-571500">
+              <a:buFont typeface="+mj-lt"/>
+              <a:buAutoNum type="romanUcPeriod"/>
+            </a:pPr>
+            <a:r>
+              <a:rPr lang="en-US" dirty="0"/>
+              <a:t>DESeq2</a:t>
+            </a:r>
+          </a:p>
+          <a:p>
+            <a:pPr marL="571500" indent="-571500">
+              <a:buFont typeface="+mj-lt"/>
+              <a:buAutoNum type="romanUcPeriod"/>
+            </a:pPr>
+            <a:r>
+              <a:rPr lang="en-US" dirty="0"/>
+              <a:t>Pathway Analysis (KEGG</a:t>
+            </a:r>
+            <a:r>
+              <a:rPr lang="en-US" dirty="0" smtClean="0"/>
+              <a:t>)</a:t>
+            </a:r>
+          </a:p>
+          <a:p>
+            <a:pPr marL="0" indent="0">
+              <a:buNone/>
+            </a:pPr>
+            <a:r>
+              <a:rPr lang="en-US" dirty="0" smtClean="0"/>
+              <a:t>Notes</a:t>
+            </a:r>
+            <a:r>
+              <a:rPr lang="en-US" dirty="0"/>
+              <a:t>: Please </a:t>
+            </a:r>
+            <a:r>
+              <a:rPr lang="en-US" dirty="0" smtClean="0"/>
+              <a:t>see </a:t>
+            </a:r>
+            <a:r>
+              <a:rPr lang="en-US" dirty="0"/>
+              <a:t>our </a:t>
+            </a:r>
+            <a:r>
+              <a:rPr lang="en-US" dirty="0" err="1" smtClean="0"/>
+              <a:t>RNASeq</a:t>
+            </a:r>
+            <a:r>
+              <a:rPr lang="en-US" dirty="0" smtClean="0"/>
+              <a:t> (bulk) analysis page in our Methods </a:t>
+            </a:r>
+            <a:r>
+              <a:rPr lang="en-US" dirty="0"/>
+              <a:t>section for a publication-friendly </a:t>
+            </a:r>
+            <a:r>
+              <a:rPr lang="en-US" dirty="0" smtClean="0"/>
+              <a:t>write-up of </a:t>
+            </a:r>
+            <a:r>
+              <a:rPr lang="en-US" dirty="0"/>
+              <a:t>our workflow</a:t>
+            </a:r>
+          </a:p>
+          <a:p>
+            <a:pPr marL="0" indent="0">
+              <a:buNone/>
+            </a:pPr>
+            <a:endParaRPr lang="en-US" dirty="0"/>
+          </a:p>
+        </p:txBody>
+      </p:sp>
+    </p:spTree>
+    <p:extLst>
+      <p:ext uri="{BB962C8B-B14F-4D97-AF65-F5344CB8AC3E}">
+        <p14:creationId xmlns:p14="http://schemas.microsoft.com/office/powerpoint/2010/main" val="3979204288"/>
+      </p:ext>
+    </p:extLst>
+  </p:cSld>
+  <p:clrMapOvr>
+    <a:masterClrMapping/>
+  </p:clrMapOvr>
+  <p:timing>
+    <p:tnLst>
+      <p:par>
+        <p:cTn id="1" dur="indefinite" restart="never" nodeType="tmRoot"/>
+      </p:par>
+    </p:tnLst>
+  </p:timing>
+</p:sld>
+</file>
+
+<file path=ppt/slides/slide20.xml><?xml version="1.0" encoding="utf-8"?>
+<p:sld xmlns:a="http://schemas.openxmlformats.org/drawingml/2006/main" xmlns:r="http://schemas.openxmlformats.org/officeDocument/2006/relationships" xmlns:p="http://schemas.openxmlformats.org/presentationml/2006/main">
+  <p:cSld>
+    <p:spTree>
+      <p:nvGrpSpPr>
+        <p:cNvPr id="1" name=""/>
+        <p:cNvGrpSpPr/>
+        <p:nvPr/>
+      </p:nvGrpSpPr>
+      <p:grpSpPr>
+        <a:xfrm>
+          <a:off x="0" y="0"/>
+          <a:ext cx="0" cy="0"/>
+          <a:chOff x="0" y="0"/>
+          <a:chExt cx="0" cy="0"/>
+        </a:xfrm>
+      </p:grpSpPr>
+      <p:sp>
+        <p:nvSpPr>
+          <p:cNvPr id="2" name="Title 1"/>
+          <p:cNvSpPr>
+            <a:spLocks noGrp="1"/>
+          </p:cNvSpPr>
+          <p:nvPr>
+            <p:ph type="title"/>
+          </p:nvPr>
+        </p:nvSpPr>
+        <p:spPr/>
+        <p:txBody>
+          <a:bodyPr/>
+          <a:lstStyle/>
+          <a:p>
+            <a:r>
+              <a:rPr lang="en-US" dirty="0"/>
+              <a:t>C</a:t>
+            </a:r>
+            <a:r>
+              <a:rPr lang="en-US" dirty="0" smtClean="0"/>
+              <a:t> vs B</a:t>
+            </a:r>
+            <a:r>
+              <a:rPr lang="en-US" dirty="0" smtClean="0"/>
+              <a:t>: </a:t>
+            </a:r>
+            <a:r>
+              <a:rPr lang="en-US" dirty="0" smtClean="0"/>
+              <a:t>Heat map</a:t>
+            </a:r>
+            <a:endParaRPr lang="en-US" dirty="0"/>
+          </a:p>
+        </p:txBody>
+      </p:sp>
+      <p:sp>
+        <p:nvSpPr>
+          <p:cNvPr id="5" name="TextBox 4"/>
+          <p:cNvSpPr txBox="1"/>
+          <p:nvPr/>
+        </p:nvSpPr>
+        <p:spPr>
+          <a:xfrm>
+            <a:off x="898071" y="2018792"/>
+            <a:ext cx="4726983" cy="4247317"/>
+          </a:xfrm>
+          <a:prstGeom prst="rect">
+            <a:avLst/>
+          </a:prstGeom>
+          <a:noFill/>
+        </p:spPr>
+        <p:txBody>
+          <a:bodyPr wrap="square" rtlCol="0">
+            <a:spAutoFit/>
+          </a:bodyPr>
+          <a:lstStyle/>
+          <a:p>
+            <a:pPr marL="285750" indent="-285750">
+              <a:buFont typeface="Arial" panose="020B0604020202020204" pitchFamily="34" charset="0"/>
+              <a:buChar char="•"/>
+            </a:pPr>
+            <a:r>
+              <a:rPr lang="en-US" dirty="0" smtClean="0"/>
+              <a:t>Color and intensity of the boxes represent changes of gene </a:t>
+            </a:r>
+            <a:r>
+              <a:rPr lang="en-US" dirty="0" smtClean="0"/>
+              <a:t>expression as quantified by row means of the normalized counts</a:t>
+            </a:r>
+          </a:p>
+          <a:p>
+            <a:pPr marL="285750" indent="-285750">
+              <a:buFont typeface="Arial" panose="020B0604020202020204" pitchFamily="34" charset="0"/>
+              <a:buChar char="•"/>
+            </a:pPr>
+            <a:r>
+              <a:rPr lang="en-US" dirty="0" smtClean="0"/>
+              <a:t>The genes listed are in decreasing order of the mean normalized counts across all samples</a:t>
+            </a:r>
+            <a:endParaRPr lang="en-US" dirty="0" smtClean="0"/>
+          </a:p>
+          <a:p>
+            <a:pPr marL="285750" indent="-285750">
+              <a:buFont typeface="Arial" panose="020B0604020202020204" pitchFamily="34" charset="0"/>
+              <a:buChar char="•"/>
+            </a:pPr>
+            <a:r>
+              <a:rPr lang="en-US" dirty="0" smtClean="0"/>
+              <a:t>Red indicates log fold changes close to </a:t>
+            </a:r>
+            <a:r>
+              <a:rPr lang="en-US" dirty="0" smtClean="0"/>
+              <a:t>16 </a:t>
+            </a:r>
+            <a:r>
+              <a:rPr lang="en-US" dirty="0" smtClean="0"/>
+              <a:t>and blue indicates log fold changes close to 8 </a:t>
+            </a:r>
+          </a:p>
+          <a:p>
+            <a:pPr marL="285750" indent="-285750">
+              <a:buFont typeface="Arial" panose="020B0604020202020204" pitchFamily="34" charset="0"/>
+              <a:buChar char="•"/>
+            </a:pPr>
+            <a:r>
+              <a:rPr lang="en-US" dirty="0" smtClean="0"/>
+              <a:t>Samples are grouped by </a:t>
+            </a:r>
+            <a:r>
+              <a:rPr lang="en-US" dirty="0" smtClean="0"/>
+              <a:t>dose group</a:t>
+            </a:r>
+            <a:r>
+              <a:rPr lang="en-US" dirty="0" smtClean="0"/>
+              <a:t> </a:t>
+            </a:r>
+            <a:r>
+              <a:rPr lang="en-US" dirty="0" smtClean="0"/>
+              <a:t>for simplified visual comparison and appear to have </a:t>
+            </a:r>
+            <a:r>
+              <a:rPr lang="en-US" dirty="0" smtClean="0"/>
+              <a:t>somewhat</a:t>
+            </a:r>
+            <a:r>
+              <a:rPr lang="en-US" dirty="0" smtClean="0"/>
+              <a:t> </a:t>
+            </a:r>
+            <a:r>
+              <a:rPr lang="en-US" dirty="0" smtClean="0"/>
+              <a:t>consistent expression within site groups</a:t>
+            </a:r>
+          </a:p>
+          <a:p>
+            <a:pPr marL="285750" indent="-285750">
+              <a:buFont typeface="Arial" panose="020B0604020202020204" pitchFamily="34" charset="0"/>
+              <a:buChar char="•"/>
+            </a:pPr>
+            <a:r>
+              <a:rPr lang="en-US" dirty="0" smtClean="0"/>
+              <a:t>As expected, both concentrations are more similar to one another than they are to concentration of 0 </a:t>
+            </a:r>
+            <a:endParaRPr lang="en-US" dirty="0"/>
+          </a:p>
+        </p:txBody>
+      </p:sp>
+      <p:pic>
+        <p:nvPicPr>
+          <p:cNvPr id="4" name="Picture 3"/>
+          <p:cNvPicPr>
+            <a:picLocks noChangeAspect="1"/>
+          </p:cNvPicPr>
+          <p:nvPr/>
+        </p:nvPicPr>
+        <p:blipFill>
+          <a:blip r:embed="rId2" cstate="print">
+            <a:extLst>
+              <a:ext uri="{28A0092B-C50C-407E-A947-70E740481C1C}">
+                <a14:useLocalDpi xmlns:a14="http://schemas.microsoft.com/office/drawing/2010/main" val="0"/>
+              </a:ext>
+            </a:extLst>
+          </a:blip>
+          <a:stretch>
+            <a:fillRect/>
+          </a:stretch>
+        </p:blipFill>
+        <p:spPr>
+          <a:xfrm>
+            <a:off x="6174910" y="800094"/>
+            <a:ext cx="5715012" cy="5715012"/>
+          </a:xfrm>
+          <a:prstGeom prst="rect">
+            <a:avLst/>
+          </a:prstGeom>
+        </p:spPr>
+      </p:pic>
+    </p:spTree>
+    <p:extLst>
+      <p:ext uri="{BB962C8B-B14F-4D97-AF65-F5344CB8AC3E}">
+        <p14:creationId xmlns:p14="http://schemas.microsoft.com/office/powerpoint/2010/main" val="2283785590"/>
+      </p:ext>
+    </p:extLst>
+  </p:cSld>
+  <p:clrMapOvr>
+    <a:masterClrMapping/>
+  </p:clrMapOvr>
+</p:sld>
+</file>
+
+<file path=ppt/slides/slide21.xml><?xml version="1.0" encoding="utf-8"?>
+<p:sld xmlns:a="http://schemas.openxmlformats.org/drawingml/2006/main" xmlns:r="http://schemas.openxmlformats.org/officeDocument/2006/relationships" xmlns:p="http://schemas.openxmlformats.org/presentationml/2006/main">
+  <p:cSld>
+    <p:spTree>
+      <p:nvGrpSpPr>
+        <p:cNvPr id="1" name=""/>
+        <p:cNvGrpSpPr/>
+        <p:nvPr/>
+      </p:nvGrpSpPr>
+      <p:grpSpPr>
+        <a:xfrm>
+          <a:off x="0" y="0"/>
+          <a:ext cx="0" cy="0"/>
+          <a:chOff x="0" y="0"/>
+          <a:chExt cx="0" cy="0"/>
+        </a:xfrm>
+      </p:grpSpPr>
+      <p:sp>
+        <p:nvSpPr>
           <p:cNvPr id="2" name="Title 1"/>
           <p:cNvSpPr>
             <a:spLocks noGrp="1"/>
@@ -5293,15 +5948,7 @@
           <a:p>
             <a:r>
               <a:rPr lang="en-US" sz="3200" dirty="0" smtClean="0"/>
-              <a:t>DE Pathway in </a:t>
-            </a:r>
-            <a:r>
-              <a:rPr lang="en-US" sz="3200" dirty="0" smtClean="0"/>
-              <a:t>B vs A and C vs A </a:t>
-            </a:r>
-            <a:r>
-              <a:rPr lang="en-US" sz="3200" dirty="0" smtClean="0"/>
-              <a:t>comparisons</a:t>
+              <a:t>DE Pathway in B vs A and C vs A comparisons</a:t>
             </a:r>
             <a:endParaRPr lang="en-US" sz="3200" dirty="0"/>
           </a:p>
@@ -5415,7 +6062,7 @@
 </p:sld>
 </file>
 
-<file path=ppt/slides/slide19.xml><?xml version="1.0" encoding="utf-8"?>
+<file path=ppt/slides/slide22.xml><?xml version="1.0" encoding="utf-8"?>
 <p:sld xmlns:a="http://schemas.openxmlformats.org/drawingml/2006/main" xmlns:r="http://schemas.openxmlformats.org/officeDocument/2006/relationships" xmlns:p="http://schemas.openxmlformats.org/presentationml/2006/main">
   <p:cSld>
     <p:spTree>
@@ -5671,296 +6318,7 @@
 </p:sld>
 </file>
 
-<file path=ppt/slides/slide2.xml><?xml version="1.0" encoding="utf-8"?>
-<p:sld xmlns:a="http://schemas.openxmlformats.org/drawingml/2006/main" xmlns:r="http://schemas.openxmlformats.org/officeDocument/2006/relationships" xmlns:p="http://schemas.openxmlformats.org/presentationml/2006/main">
-  <p:cSld>
-    <p:spTree>
-      <p:nvGrpSpPr>
-        <p:cNvPr id="1" name=""/>
-        <p:cNvGrpSpPr/>
-        <p:nvPr/>
-      </p:nvGrpSpPr>
-      <p:grpSpPr>
-        <a:xfrm>
-          <a:off x="0" y="0"/>
-          <a:ext cx="0" cy="0"/>
-          <a:chOff x="0" y="0"/>
-          <a:chExt cx="0" cy="0"/>
-        </a:xfrm>
-      </p:grpSpPr>
-      <p:sp>
-        <p:nvSpPr>
-          <p:cNvPr id="2" name="Title 1">
-            <a:extLst>
-              <a:ext uri="{FF2B5EF4-FFF2-40B4-BE49-F238E27FC236}">
-                <a16:creationId xmlns:a16="http://schemas.microsoft.com/office/drawing/2014/main" id="{3A2D132A-48CD-CA44-9040-8CD5E5DD4DEB}"/>
-              </a:ext>
-            </a:extLst>
-          </p:cNvPr>
-          <p:cNvSpPr>
-            <a:spLocks noGrp="1"/>
-          </p:cNvSpPr>
-          <p:nvPr>
-            <p:ph type="title"/>
-          </p:nvPr>
-        </p:nvSpPr>
-        <p:spPr/>
-        <p:txBody>
-          <a:bodyPr/>
-          <a:lstStyle/>
-          <a:p>
-            <a:r>
-              <a:rPr lang="en-US" dirty="0" err="1"/>
-              <a:t>RNASeq</a:t>
-            </a:r>
-            <a:r>
-              <a:rPr lang="en-US" dirty="0"/>
-              <a:t> Analysis Workflow</a:t>
-            </a:r>
-          </a:p>
-        </p:txBody>
-      </p:sp>
-      <p:sp>
-        <p:nvSpPr>
-          <p:cNvPr id="3" name="Content Placeholder 2">
-            <a:extLst>
-              <a:ext uri="{FF2B5EF4-FFF2-40B4-BE49-F238E27FC236}">
-                <a16:creationId xmlns:a16="http://schemas.microsoft.com/office/drawing/2014/main" id="{BC867114-6E4A-F345-9EBB-6E085C92DE33}"/>
-              </a:ext>
-            </a:extLst>
-          </p:cNvPr>
-          <p:cNvSpPr>
-            <a:spLocks noGrp="1"/>
-          </p:cNvSpPr>
-          <p:nvPr>
-            <p:ph idx="1"/>
-          </p:nvPr>
-        </p:nvSpPr>
-        <p:spPr/>
-        <p:txBody>
-          <a:bodyPr>
-            <a:normAutofit fontScale="92500" lnSpcReduction="20000"/>
-          </a:bodyPr>
-          <a:lstStyle/>
-          <a:p>
-            <a:pPr marL="571500" indent="-571500">
-              <a:buFont typeface="+mj-lt"/>
-              <a:buAutoNum type="romanUcPeriod"/>
-            </a:pPr>
-            <a:r>
-              <a:rPr lang="en-US" dirty="0"/>
-              <a:t>QC at .</a:t>
-            </a:r>
-            <a:r>
-              <a:rPr lang="en-US" dirty="0" err="1"/>
-              <a:t>fastq</a:t>
-            </a:r>
-            <a:r>
-              <a:rPr lang="en-US" dirty="0"/>
-              <a:t> stage</a:t>
-            </a:r>
-          </a:p>
-          <a:p>
-            <a:pPr marL="1028700" lvl="1" indent="-571500">
-              <a:buFont typeface="+mj-lt"/>
-              <a:buAutoNum type="romanUcPeriod"/>
-            </a:pPr>
-            <a:r>
-              <a:rPr lang="en-US" dirty="0" err="1"/>
-              <a:t>FastQC</a:t>
-            </a:r>
-            <a:r>
-              <a:rPr lang="en-US" dirty="0"/>
-              <a:t> , </a:t>
-            </a:r>
-            <a:r>
-              <a:rPr lang="en-US" dirty="0" err="1"/>
-              <a:t>Fastq</a:t>
-            </a:r>
-            <a:r>
-              <a:rPr lang="en-US" dirty="0"/>
-              <a:t>-Screen, </a:t>
-            </a:r>
-            <a:r>
-              <a:rPr lang="en-US" dirty="0" err="1"/>
-              <a:t>MultiQC</a:t>
-            </a:r>
-            <a:r>
-              <a:rPr lang="en-US" dirty="0"/>
-              <a:t>, &amp; </a:t>
-            </a:r>
-            <a:r>
-              <a:rPr lang="en-US" dirty="0" err="1"/>
-              <a:t>Trimmomatic</a:t>
-            </a:r>
-            <a:r>
-              <a:rPr lang="en-US" dirty="0"/>
-              <a:t> if necessary</a:t>
-            </a:r>
-          </a:p>
-          <a:p>
-            <a:pPr marL="571500" indent="-571500">
-              <a:buFont typeface="+mj-lt"/>
-              <a:buAutoNum type="romanUcPeriod"/>
-            </a:pPr>
-            <a:r>
-              <a:rPr lang="en-US" dirty="0"/>
-              <a:t>Alignment to reference genome </a:t>
-            </a:r>
-          </a:p>
-          <a:p>
-            <a:pPr marL="1028700" lvl="1" indent="-571500">
-              <a:buFont typeface="+mj-lt"/>
-              <a:buAutoNum type="romanUcPeriod"/>
-            </a:pPr>
-            <a:r>
-              <a:rPr lang="en-US" dirty="0"/>
-              <a:t>STAR – mm10 genome for </a:t>
-            </a:r>
-            <a:r>
-              <a:rPr lang="en-US" i="1" dirty="0"/>
-              <a:t>M. musculus</a:t>
-            </a:r>
-            <a:r>
-              <a:rPr lang="en-US" dirty="0"/>
-              <a:t>, UCSC</a:t>
-            </a:r>
-          </a:p>
-          <a:p>
-            <a:pPr marL="1028700" lvl="1" indent="-571500">
-              <a:buFont typeface="+mj-lt"/>
-              <a:buAutoNum type="romanUcPeriod"/>
-            </a:pPr>
-            <a:r>
-              <a:rPr lang="en-US" dirty="0"/>
-              <a:t>Sort and index .bam files</a:t>
-            </a:r>
-          </a:p>
-          <a:p>
-            <a:pPr marL="571500" indent="-571500">
-              <a:buFont typeface="+mj-lt"/>
-              <a:buAutoNum type="romanUcPeriod"/>
-            </a:pPr>
-            <a:r>
-              <a:rPr lang="en-US" dirty="0"/>
-              <a:t>Generation of raw counts from alignment .bam files</a:t>
-            </a:r>
-          </a:p>
-          <a:p>
-            <a:pPr marL="1028700" lvl="1" indent="-571500">
-              <a:buFont typeface="+mj-lt"/>
-              <a:buAutoNum type="romanUcPeriod"/>
-            </a:pPr>
-            <a:r>
-              <a:rPr lang="en-US" dirty="0" err="1"/>
-              <a:t>HTSeq</a:t>
-            </a:r>
-            <a:endParaRPr lang="en-US" dirty="0"/>
-          </a:p>
-          <a:p>
-            <a:pPr marL="571500" indent="-571500">
-              <a:buFont typeface="+mj-lt"/>
-              <a:buAutoNum type="romanUcPeriod"/>
-            </a:pPr>
-            <a:r>
-              <a:rPr lang="en-US" dirty="0"/>
-              <a:t>Differential Expression Analysis</a:t>
-            </a:r>
-          </a:p>
-          <a:p>
-            <a:pPr marL="1028700" lvl="1" indent="-571500">
-              <a:buFont typeface="+mj-lt"/>
-              <a:buAutoNum type="romanUcPeriod"/>
-            </a:pPr>
-            <a:r>
-              <a:rPr lang="en-US" dirty="0"/>
-              <a:t>DESeq2</a:t>
-            </a:r>
-          </a:p>
-          <a:p>
-            <a:pPr marL="571500" indent="-571500">
-              <a:buFont typeface="+mj-lt"/>
-              <a:buAutoNum type="romanUcPeriod"/>
-            </a:pPr>
-            <a:r>
-              <a:rPr lang="en-US" dirty="0"/>
-              <a:t>Pathway Analysis (KEGG</a:t>
-            </a:r>
-            <a:r>
-              <a:rPr lang="en-US" dirty="0" smtClean="0"/>
-              <a:t>)</a:t>
-            </a:r>
-          </a:p>
-          <a:p>
-            <a:pPr marL="0" indent="0">
-              <a:buNone/>
-            </a:pPr>
-            <a:r>
-              <a:rPr lang="en-US" dirty="0" smtClean="0"/>
-              <a:t>Notes</a:t>
-            </a:r>
-            <a:r>
-              <a:rPr lang="en-US" dirty="0"/>
-              <a:t>: Please </a:t>
-            </a:r>
-            <a:r>
-              <a:rPr lang="en-US" dirty="0" smtClean="0"/>
-              <a:t>see </a:t>
-            </a:r>
-            <a:r>
-              <a:rPr lang="en-US" dirty="0"/>
-              <a:t>our </a:t>
-            </a:r>
-            <a:r>
-              <a:rPr lang="en-US" dirty="0" err="1" smtClean="0"/>
-              <a:t>RNASeq</a:t>
-            </a:r>
-            <a:r>
-              <a:rPr lang="en-US" dirty="0" smtClean="0"/>
-              <a:t> (bulk) analysis page in our Methods </a:t>
-            </a:r>
-            <a:r>
-              <a:rPr lang="en-US" dirty="0"/>
-              <a:t>section for a publication-friendly </a:t>
-            </a:r>
-            <a:r>
-              <a:rPr lang="en-US" dirty="0" smtClean="0"/>
-              <a:t>write-up of </a:t>
-            </a:r>
-            <a:r>
-              <a:rPr lang="en-US" dirty="0"/>
-              <a:t>our workflow</a:t>
-            </a:r>
-          </a:p>
-          <a:p>
-            <a:pPr marL="0" indent="0">
-              <a:buNone/>
-            </a:pPr>
-            <a:endParaRPr lang="en-US" dirty="0"/>
-          </a:p>
-        </p:txBody>
-      </p:sp>
-    </p:spTree>
-    <p:extLst>
-      <p:ext uri="{BB962C8B-B14F-4D97-AF65-F5344CB8AC3E}">
-        <p14:creationId xmlns:p14="http://schemas.microsoft.com/office/powerpoint/2010/main" val="3979204288"/>
-      </p:ext>
-    </p:extLst>
-  </p:cSld>
-  <p:clrMapOvr>
-    <a:masterClrMapping/>
-  </p:clrMapOvr>
-  <p:timing>
-    <p:tnLst>
-      <p:par>
-        <p:cTn id="1" dur="indefinite" restart="never" nodeType="tmRoot"/>
-      </p:par>
-    </p:tnLst>
-  </p:timing>
-</p:sld>
-</file>
-
-<file path=ppt/slides/slide20.xml><?xml version="1.0" encoding="utf-8"?>
+<file path=ppt/slides/slide23.xml><?xml version="1.0" encoding="utf-8"?>
 <p:sld xmlns:a="http://schemas.openxmlformats.org/drawingml/2006/main" xmlns:r="http://schemas.openxmlformats.org/officeDocument/2006/relationships" xmlns:p="http://schemas.openxmlformats.org/presentationml/2006/main">
   <p:cSld>
     <p:spTree>
@@ -7194,15 +7552,17 @@
         <p:spPr>
           <a:xfrm>
             <a:off x="838200" y="500062"/>
-            <a:ext cx="10515600" cy="1325563"/>
+            <a:ext cx="10515600" cy="1078015"/>
           </a:xfrm>
         </p:spPr>
         <p:txBody>
-          <a:bodyPr/>
-          <a:lstStyle/>
-          <a:p>
-            <a:r>
-              <a:rPr lang="en-US" sz="3200" dirty="0"/>
+          <a:bodyPr>
+            <a:normAutofit fontScale="90000"/>
+          </a:bodyPr>
+          <a:lstStyle/>
+          <a:p>
+            <a:r>
+              <a:rPr lang="en-US" sz="3600" dirty="0"/>
               <a:t>Hypothesis:</a:t>
             </a:r>
             <a:r>
@@ -7216,777 +7576,98 @@
           </a:p>
         </p:txBody>
       </p:sp>
-      <mc:AlternateContent xmlns:mc="http://schemas.openxmlformats.org/markup-compatibility/2006" xmlns:a14="http://schemas.microsoft.com/office/drawing/2010/main">
-        <mc:Choice Requires="a14">
-          <p:sp>
-            <p:nvSpPr>
-              <p:cNvPr id="3" name="Content Placeholder 2"/>
-              <p:cNvSpPr>
-                <a:spLocks noGrp="1"/>
-              </p:cNvSpPr>
-              <p:nvPr>
-                <p:ph idx="1"/>
-              </p:nvPr>
-            </p:nvSpPr>
-            <p:spPr>
-              <a:xfrm>
-                <a:off x="838200" y="1260987"/>
-                <a:ext cx="10515600" cy="4915976"/>
-              </a:xfrm>
-            </p:spPr>
-            <p:txBody>
-              <a:bodyPr>
-                <a:normAutofit/>
-              </a:bodyPr>
-              <a:lstStyle/>
-              <a:p>
-                <a:r>
-                  <a:rPr lang="en-US" sz="1800" dirty="0" smtClean="0"/>
-                  <a:t>With DEG analysis using the Likelihood Ratio test </a:t>
-                </a:r>
-                <a:r>
-                  <a:rPr lang="en-US" sz="1800" dirty="0"/>
-                  <a:t>we are looking to reject the idea that </a:t>
-                </a:r>
-                <a:r>
-                  <a:rPr lang="en-US" sz="1800" dirty="0" smtClean="0"/>
-                  <a:t>none of these groups are significantly associated with differences in gene expression between any of the groups</a:t>
-                </a:r>
-              </a:p>
-              <a:p>
-                <a:r>
-                  <a:rPr lang="en-US" sz="1800" dirty="0" smtClean="0"/>
-                  <a:t>Think of </a:t>
-                </a:r>
-                <a14:m>
-                  <m:oMath xmlns:m="http://schemas.openxmlformats.org/officeDocument/2006/math">
-                    <m:acc>
-                      <m:accPr>
-                        <m:chr m:val="̂"/>
-                        <m:ctrlPr>
-                          <a:rPr lang="el-GR" sz="1800" i="1" dirty="0" smtClean="0">
-                            <a:latin typeface="Cambria Math" panose="02040503050406030204" pitchFamily="18" charset="0"/>
-                          </a:rPr>
-                        </m:ctrlPr>
-                      </m:accPr>
-                      <m:e>
-                        <m:r>
-                          <a:rPr lang="el-GR" sz="1800" i="1" dirty="0">
-                            <a:latin typeface="Cambria Math" panose="02040503050406030204" pitchFamily="18" charset="0"/>
-                          </a:rPr>
-                          <m:t>𝛽</m:t>
-                        </m:r>
-                        <m:r>
-                          <a:rPr lang="en-US" sz="1800" i="1" dirty="0">
-                            <a:latin typeface="Cambria Math" panose="02040503050406030204" pitchFamily="18" charset="0"/>
-                          </a:rPr>
-                          <m:t>1</m:t>
-                        </m:r>
-                      </m:e>
-                    </m:acc>
-                    <m:r>
-                      <a:rPr lang="en-US" sz="1800" b="0" i="1" dirty="0" smtClean="0">
-                        <a:latin typeface="Cambria Math" panose="02040503050406030204" pitchFamily="18" charset="0"/>
-                      </a:rPr>
-                      <m:t> </m:t>
-                    </m:r>
-                  </m:oMath>
-                </a14:m>
-                <a:r>
-                  <a:rPr lang="en-US" sz="1800" dirty="0" smtClean="0"/>
-                  <a:t>(beta 1 hat)  being a numerical estimate of how much being in any of the three groups is contributing to gene expression (</a:t>
-                </a:r>
-                <a14:m>
-                  <m:oMath xmlns:m="http://schemas.openxmlformats.org/officeDocument/2006/math">
-                    <m:acc>
-                      <m:accPr>
-                        <m:chr m:val="̂"/>
-                        <m:ctrlPr>
-                          <a:rPr lang="en-US" sz="1800" i="1" dirty="0" smtClean="0">
-                            <a:latin typeface="Cambria Math" panose="02040503050406030204" pitchFamily="18" charset="0"/>
-                          </a:rPr>
-                        </m:ctrlPr>
-                      </m:accPr>
-                      <m:e>
-                        <m:r>
-                          <a:rPr lang="en-US" sz="1800" b="0" i="1" dirty="0" smtClean="0">
-                            <a:latin typeface="Cambria Math" panose="02040503050406030204" pitchFamily="18" charset="0"/>
-                          </a:rPr>
-                          <m:t>𝑦</m:t>
-                        </m:r>
-                      </m:e>
-                    </m:acc>
-                  </m:oMath>
-                </a14:m>
-                <a:r>
-                  <a:rPr lang="en-US" sz="1800" dirty="0" smtClean="0"/>
-                  <a:t>). If it is equal to zero, that means being in any of the groups does not significantly contribute to an individual gene’s expression</a:t>
-                </a:r>
-              </a:p>
-              <a:p>
-                <a:pPr marL="457200" lvl="1" indent="0">
-                  <a:buNone/>
-                </a:pPr>
-                <a:r>
-                  <a:rPr lang="en-US" sz="1800" dirty="0" smtClean="0"/>
-                  <a:t>Our null hypothesis is that being in these groups does not contribute in any significant way (</a:t>
-                </a:r>
-                <a14:m>
-                  <m:oMath xmlns:m="http://schemas.openxmlformats.org/officeDocument/2006/math">
-                    <m:acc>
-                      <m:accPr>
-                        <m:chr m:val="̂"/>
-                        <m:ctrlPr>
-                          <a:rPr lang="el-GR" sz="1800" i="1" dirty="0">
-                            <a:latin typeface="Cambria Math" panose="02040503050406030204" pitchFamily="18" charset="0"/>
-                          </a:rPr>
-                        </m:ctrlPr>
-                      </m:accPr>
-                      <m:e>
-                        <m:r>
-                          <a:rPr lang="el-GR" sz="1800" i="1" dirty="0">
-                            <a:latin typeface="Cambria Math" panose="02040503050406030204" pitchFamily="18" charset="0"/>
-                          </a:rPr>
-                          <m:t>𝛽</m:t>
-                        </m:r>
-                        <m:r>
-                          <a:rPr lang="en-US" sz="1800" i="1" dirty="0">
-                            <a:latin typeface="Cambria Math" panose="02040503050406030204" pitchFamily="18" charset="0"/>
-                          </a:rPr>
-                          <m:t>1</m:t>
-                        </m:r>
-                      </m:e>
-                    </m:acc>
-                  </m:oMath>
-                </a14:m>
-                <a:r>
-                  <a:rPr lang="en-US" sz="1800" dirty="0"/>
-                  <a:t> +  </a:t>
-                </a:r>
-                <a14:m>
-                  <m:oMath xmlns:m="http://schemas.openxmlformats.org/officeDocument/2006/math">
-                    <m:acc>
-                      <m:accPr>
-                        <m:chr m:val="̂"/>
-                        <m:ctrlPr>
-                          <a:rPr lang="el-GR" sz="1800" i="1" dirty="0">
-                            <a:latin typeface="Cambria Math" panose="02040503050406030204" pitchFamily="18" charset="0"/>
-                          </a:rPr>
-                        </m:ctrlPr>
-                      </m:accPr>
-                      <m:e>
-                        <m:r>
-                          <a:rPr lang="el-GR" sz="1800" i="1" dirty="0">
-                            <a:latin typeface="Cambria Math" panose="02040503050406030204" pitchFamily="18" charset="0"/>
-                          </a:rPr>
-                          <m:t>𝛽</m:t>
-                        </m:r>
-                        <m:r>
-                          <a:rPr lang="en-US" sz="1800" i="1" dirty="0">
-                            <a:latin typeface="Cambria Math" panose="02040503050406030204" pitchFamily="18" charset="0"/>
-                          </a:rPr>
-                          <m:t>2</m:t>
-                        </m:r>
-                      </m:e>
-                    </m:acc>
-                  </m:oMath>
-                </a14:m>
-                <a:r>
-                  <a:rPr lang="en-US" sz="1800" dirty="0" smtClean="0"/>
-                  <a:t> = 0</a:t>
-                </a:r>
-                <a:r>
-                  <a:rPr lang="en-US" sz="1800" dirty="0"/>
-                  <a:t>)</a:t>
-                </a:r>
-                <a:r>
-                  <a:rPr lang="en-US" sz="1800" dirty="0" smtClean="0"/>
-                  <a:t> and our alternative is that they do </a:t>
-                </a:r>
-                <a14:m>
-                  <m:oMath xmlns:m="http://schemas.openxmlformats.org/officeDocument/2006/math">
-                    <m:acc>
-                      <m:accPr>
-                        <m:chr m:val="̂"/>
-                        <m:ctrlPr>
-                          <a:rPr lang="el-GR" sz="1800" i="1" dirty="0">
-                            <a:latin typeface="Cambria Math" panose="02040503050406030204" pitchFamily="18" charset="0"/>
-                          </a:rPr>
-                        </m:ctrlPr>
-                      </m:accPr>
-                      <m:e>
-                        <m:r>
-                          <a:rPr lang="en-US" sz="1800" i="1" dirty="0">
-                            <a:latin typeface="Cambria Math" panose="02040503050406030204" pitchFamily="18" charset="0"/>
-                          </a:rPr>
-                          <m:t>(</m:t>
-                        </m:r>
-                        <m:r>
-                          <a:rPr lang="el-GR" sz="1800" i="1" dirty="0">
-                            <a:latin typeface="Cambria Math" panose="02040503050406030204" pitchFamily="18" charset="0"/>
-                          </a:rPr>
-                          <m:t>𝛽</m:t>
-                        </m:r>
-                        <m:r>
-                          <a:rPr lang="en-US" sz="1800" i="1" dirty="0">
-                            <a:latin typeface="Cambria Math" panose="02040503050406030204" pitchFamily="18" charset="0"/>
-                          </a:rPr>
-                          <m:t>1</m:t>
-                        </m:r>
-                      </m:e>
-                    </m:acc>
-                  </m:oMath>
-                </a14:m>
-                <a:r>
-                  <a:rPr lang="en-US" sz="1800" dirty="0"/>
-                  <a:t> +  </a:t>
-                </a:r>
-                <a14:m>
-                  <m:oMath xmlns:m="http://schemas.openxmlformats.org/officeDocument/2006/math">
-                    <m:acc>
-                      <m:accPr>
-                        <m:chr m:val="̂"/>
-                        <m:ctrlPr>
-                          <a:rPr lang="el-GR" sz="1800" i="1" dirty="0">
-                            <a:latin typeface="Cambria Math" panose="02040503050406030204" pitchFamily="18" charset="0"/>
-                          </a:rPr>
-                        </m:ctrlPr>
-                      </m:accPr>
-                      <m:e>
-                        <m:r>
-                          <a:rPr lang="el-GR" sz="1800" i="1" dirty="0">
-                            <a:latin typeface="Cambria Math" panose="02040503050406030204" pitchFamily="18" charset="0"/>
-                          </a:rPr>
-                          <m:t>𝛽</m:t>
-                        </m:r>
-                        <m:r>
-                          <a:rPr lang="en-US" sz="1800" i="1" dirty="0">
-                            <a:latin typeface="Cambria Math" panose="02040503050406030204" pitchFamily="18" charset="0"/>
-                          </a:rPr>
-                          <m:t>2</m:t>
-                        </m:r>
-                      </m:e>
-                    </m:acc>
-                  </m:oMath>
-                </a14:m>
-                <a:r>
-                  <a:rPr lang="en-US" sz="1800" dirty="0"/>
-                  <a:t> ≠ 0)</a:t>
-                </a:r>
-              </a:p>
-              <a:p>
-                <a:pPr marL="0" indent="0">
-                  <a:buNone/>
-                </a:pPr>
-                <a:endParaRPr lang="en-US" sz="1800" dirty="0"/>
-              </a:p>
-              <a:p>
-                <a:pPr marL="457200" lvl="1" indent="0">
-                  <a:buNone/>
-                </a:pPr>
-                <a:r>
-                  <a:rPr lang="en-US" sz="1800" dirty="0" err="1"/>
-                  <a:t>Hnull</a:t>
-                </a:r>
-                <a:r>
-                  <a:rPr lang="en-US" sz="1800" dirty="0"/>
-                  <a:t>: </a:t>
-                </a:r>
-                <a14:m>
-                  <m:oMath xmlns:m="http://schemas.openxmlformats.org/officeDocument/2006/math">
-                    <m:acc>
-                      <m:accPr>
-                        <m:chr m:val="̂"/>
-                        <m:ctrlPr>
-                          <a:rPr lang="en-US" sz="1800" i="1" dirty="0">
-                            <a:latin typeface="Cambria Math" panose="02040503050406030204" pitchFamily="18" charset="0"/>
-                          </a:rPr>
-                        </m:ctrlPr>
-                      </m:accPr>
-                      <m:e>
-                        <m:r>
-                          <a:rPr lang="en-US" sz="1800" i="1" dirty="0">
-                            <a:latin typeface="Cambria Math" panose="02040503050406030204" pitchFamily="18" charset="0"/>
-                          </a:rPr>
-                          <m:t>𝑦</m:t>
-                        </m:r>
-                      </m:e>
-                    </m:acc>
-                  </m:oMath>
-                </a14:m>
-                <a:r>
-                  <a:rPr lang="en-US" sz="1800" dirty="0" smtClean="0"/>
-                  <a:t>= </a:t>
-                </a:r>
-                <a14:m>
-                  <m:oMath xmlns:m="http://schemas.openxmlformats.org/officeDocument/2006/math">
-                    <m:acc>
-                      <m:accPr>
-                        <m:chr m:val="̂"/>
-                        <m:ctrlPr>
-                          <a:rPr lang="el-GR" sz="1800" i="1" dirty="0" smtClean="0">
-                            <a:latin typeface="Cambria Math" panose="02040503050406030204" pitchFamily="18" charset="0"/>
-                          </a:rPr>
-                        </m:ctrlPr>
-                      </m:accPr>
-                      <m:e>
-                        <m:r>
-                          <a:rPr lang="el-GR" sz="1800" i="1" dirty="0">
-                            <a:latin typeface="Cambria Math" panose="02040503050406030204" pitchFamily="18" charset="0"/>
-                          </a:rPr>
-                          <m:t>𝛽</m:t>
-                        </m:r>
-                      </m:e>
-                    </m:acc>
-                    <m:r>
-                      <a:rPr lang="en-US" sz="1800" i="1" dirty="0">
-                        <a:latin typeface="Cambria Math" panose="02040503050406030204" pitchFamily="18" charset="0"/>
-                      </a:rPr>
-                      <m:t>𝑜</m:t>
-                    </m:r>
-                  </m:oMath>
-                </a14:m>
-                <a:r>
-                  <a:rPr lang="en-US" sz="1800" dirty="0" smtClean="0"/>
-                  <a:t>+ </a:t>
-                </a:r>
-                <a14:m>
-                  <m:oMath xmlns:m="http://schemas.openxmlformats.org/officeDocument/2006/math">
-                    <m:acc>
-                      <m:accPr>
-                        <m:chr m:val="̂"/>
-                        <m:ctrlPr>
-                          <a:rPr lang="el-GR" sz="1800" i="1" dirty="0">
-                            <a:latin typeface="Cambria Math" panose="02040503050406030204" pitchFamily="18" charset="0"/>
-                          </a:rPr>
-                        </m:ctrlPr>
-                      </m:accPr>
-                      <m:e>
-                        <m:r>
-                          <a:rPr lang="el-GR" sz="1800" i="1" dirty="0">
-                            <a:latin typeface="Cambria Math" panose="02040503050406030204" pitchFamily="18" charset="0"/>
-                          </a:rPr>
-                          <m:t>𝛽</m:t>
-                        </m:r>
-                        <m:r>
-                          <a:rPr lang="en-US" sz="1800" i="1" dirty="0">
-                            <a:latin typeface="Cambria Math" panose="02040503050406030204" pitchFamily="18" charset="0"/>
-                          </a:rPr>
-                          <m:t>1</m:t>
-                        </m:r>
-                      </m:e>
-                    </m:acc>
-                  </m:oMath>
-                </a14:m>
-                <a:r>
-                  <a:rPr lang="en-US" sz="1800" dirty="0" smtClean="0"/>
-                  <a:t>* Day (One, Three)+ </a:t>
-                </a:r>
-                <a14:m>
-                  <m:oMath xmlns:m="http://schemas.openxmlformats.org/officeDocument/2006/math">
-                    <m:acc>
-                      <m:accPr>
-                        <m:chr m:val="̂"/>
-                        <m:ctrlPr>
-                          <a:rPr lang="el-GR" sz="1800" i="1" dirty="0">
-                            <a:latin typeface="Cambria Math" panose="02040503050406030204" pitchFamily="18" charset="0"/>
-                          </a:rPr>
-                        </m:ctrlPr>
-                      </m:accPr>
-                      <m:e>
-                        <m:r>
-                          <a:rPr lang="el-GR" sz="1800" i="1" dirty="0">
-                            <a:latin typeface="Cambria Math" panose="02040503050406030204" pitchFamily="18" charset="0"/>
-                          </a:rPr>
-                          <m:t>𝛽</m:t>
-                        </m:r>
-                        <m:r>
-                          <a:rPr lang="en-US" sz="1800" b="0" i="1" dirty="0" smtClean="0">
-                            <a:latin typeface="Cambria Math" panose="02040503050406030204" pitchFamily="18" charset="0"/>
-                          </a:rPr>
-                          <m:t>2</m:t>
-                        </m:r>
-                      </m:e>
-                    </m:acc>
-                  </m:oMath>
-                </a14:m>
-                <a:r>
-                  <a:rPr lang="en-US" sz="1800" dirty="0"/>
-                  <a:t>* </a:t>
-                </a:r>
-                <a:r>
-                  <a:rPr lang="en-US" sz="1800" dirty="0" smtClean="0"/>
-                  <a:t>Condition (FTY vs Blank), (</a:t>
-                </a:r>
-                <a14:m>
-                  <m:oMath xmlns:m="http://schemas.openxmlformats.org/officeDocument/2006/math">
-                    <m:acc>
-                      <m:accPr>
-                        <m:chr m:val="̂"/>
-                        <m:ctrlPr>
-                          <a:rPr lang="el-GR" sz="1800" i="1" dirty="0">
-                            <a:latin typeface="Cambria Math" panose="02040503050406030204" pitchFamily="18" charset="0"/>
-                          </a:rPr>
-                        </m:ctrlPr>
-                      </m:accPr>
-                      <m:e>
-                        <m:r>
-                          <a:rPr lang="el-GR" sz="1800" i="1" dirty="0">
-                            <a:latin typeface="Cambria Math" panose="02040503050406030204" pitchFamily="18" charset="0"/>
-                          </a:rPr>
-                          <m:t>𝛽</m:t>
-                        </m:r>
-                        <m:r>
-                          <a:rPr lang="en-US" sz="1800" i="1" dirty="0">
-                            <a:latin typeface="Cambria Math" panose="02040503050406030204" pitchFamily="18" charset="0"/>
-                          </a:rPr>
-                          <m:t>1</m:t>
-                        </m:r>
-                      </m:e>
-                    </m:acc>
-                  </m:oMath>
-                </a14:m>
-                <a:r>
-                  <a:rPr lang="en-US" sz="1800" dirty="0"/>
-                  <a:t> +  </a:t>
-                </a:r>
-                <a14:m>
-                  <m:oMath xmlns:m="http://schemas.openxmlformats.org/officeDocument/2006/math">
-                    <m:acc>
-                      <m:accPr>
-                        <m:chr m:val="̂"/>
-                        <m:ctrlPr>
-                          <a:rPr lang="el-GR" sz="1800" i="1" dirty="0">
-                            <a:latin typeface="Cambria Math" panose="02040503050406030204" pitchFamily="18" charset="0"/>
-                          </a:rPr>
-                        </m:ctrlPr>
-                      </m:accPr>
-                      <m:e>
-                        <m:r>
-                          <a:rPr lang="el-GR" sz="1800" i="1" dirty="0">
-                            <a:latin typeface="Cambria Math" panose="02040503050406030204" pitchFamily="18" charset="0"/>
-                          </a:rPr>
-                          <m:t>𝛽</m:t>
-                        </m:r>
-                        <m:r>
-                          <a:rPr lang="en-US" sz="1800" i="1" dirty="0">
-                            <a:latin typeface="Cambria Math" panose="02040503050406030204" pitchFamily="18" charset="0"/>
-                          </a:rPr>
-                          <m:t>2</m:t>
-                        </m:r>
-                      </m:e>
-                    </m:acc>
-                  </m:oMath>
-                </a14:m>
-                <a:r>
-                  <a:rPr lang="en-US" sz="1800" dirty="0"/>
-                  <a:t> = 0) </a:t>
-                </a:r>
-              </a:p>
-              <a:p>
-                <a:pPr marL="457200" lvl="1" indent="0">
-                  <a:buNone/>
-                </a:pPr>
-                <a:r>
-                  <a:rPr lang="en-US" sz="1800" dirty="0" err="1"/>
-                  <a:t>Halternative</a:t>
-                </a:r>
-                <a:r>
-                  <a:rPr lang="en-US" sz="1800" dirty="0"/>
-                  <a:t>: </a:t>
-                </a:r>
-                <a14:m>
-                  <m:oMath xmlns:m="http://schemas.openxmlformats.org/officeDocument/2006/math">
-                    <m:acc>
-                      <m:accPr>
-                        <m:chr m:val="̂"/>
-                        <m:ctrlPr>
-                          <a:rPr lang="en-US" sz="1800" i="1" dirty="0">
-                            <a:latin typeface="Cambria Math" panose="02040503050406030204" pitchFamily="18" charset="0"/>
-                          </a:rPr>
-                        </m:ctrlPr>
-                      </m:accPr>
-                      <m:e>
-                        <m:r>
-                          <a:rPr lang="en-US" sz="1800" i="1" dirty="0">
-                            <a:latin typeface="Cambria Math" panose="02040503050406030204" pitchFamily="18" charset="0"/>
-                          </a:rPr>
-                          <m:t>𝑦</m:t>
-                        </m:r>
-                      </m:e>
-                    </m:acc>
-                  </m:oMath>
-                </a14:m>
-                <a:r>
-                  <a:rPr lang="en-US" sz="1800" dirty="0" smtClean="0"/>
-                  <a:t>= </a:t>
-                </a:r>
-                <a14:m>
-                  <m:oMath xmlns:m="http://schemas.openxmlformats.org/officeDocument/2006/math">
-                    <m:acc>
-                      <m:accPr>
-                        <m:chr m:val="̂"/>
-                        <m:ctrlPr>
-                          <a:rPr lang="el-GR" sz="1800" i="1" dirty="0">
-                            <a:latin typeface="Cambria Math" panose="02040503050406030204" pitchFamily="18" charset="0"/>
-                          </a:rPr>
-                        </m:ctrlPr>
-                      </m:accPr>
-                      <m:e>
-                        <m:r>
-                          <a:rPr lang="el-GR" sz="1800" i="1" dirty="0">
-                            <a:latin typeface="Cambria Math" panose="02040503050406030204" pitchFamily="18" charset="0"/>
-                          </a:rPr>
-                          <m:t>𝛽</m:t>
-                        </m:r>
-                      </m:e>
-                    </m:acc>
-                    <m:r>
-                      <a:rPr lang="en-US" sz="1800" i="1" dirty="0">
-                        <a:latin typeface="Cambria Math" panose="02040503050406030204" pitchFamily="18" charset="0"/>
-                      </a:rPr>
-                      <m:t>𝑜</m:t>
-                    </m:r>
-                  </m:oMath>
-                </a14:m>
-                <a:r>
-                  <a:rPr lang="en-US" sz="1800" dirty="0"/>
-                  <a:t>+ </a:t>
-                </a:r>
-                <a14:m>
-                  <m:oMath xmlns:m="http://schemas.openxmlformats.org/officeDocument/2006/math">
-                    <m:acc>
-                      <m:accPr>
-                        <m:chr m:val="̂"/>
-                        <m:ctrlPr>
-                          <a:rPr lang="el-GR" sz="1800" i="1" dirty="0">
-                            <a:latin typeface="Cambria Math" panose="02040503050406030204" pitchFamily="18" charset="0"/>
-                          </a:rPr>
-                        </m:ctrlPr>
-                      </m:accPr>
-                      <m:e>
-                        <m:r>
-                          <a:rPr lang="el-GR" sz="1800" i="1" dirty="0">
-                            <a:latin typeface="Cambria Math" panose="02040503050406030204" pitchFamily="18" charset="0"/>
-                          </a:rPr>
-                          <m:t>𝛽</m:t>
-                        </m:r>
-                        <m:r>
-                          <a:rPr lang="en-US" sz="1800" i="1" dirty="0">
-                            <a:latin typeface="Cambria Math" panose="02040503050406030204" pitchFamily="18" charset="0"/>
-                          </a:rPr>
-                          <m:t>1</m:t>
-                        </m:r>
-                      </m:e>
-                    </m:acc>
-                  </m:oMath>
-                </a14:m>
-                <a:r>
-                  <a:rPr lang="en-US" sz="1800" dirty="0"/>
-                  <a:t>* </a:t>
-                </a:r>
-                <a:r>
-                  <a:rPr lang="en-US" sz="1800" dirty="0" smtClean="0"/>
-                  <a:t>Day </a:t>
-                </a:r>
-                <a:r>
-                  <a:rPr lang="en-US" sz="1800" dirty="0"/>
-                  <a:t>(One, </a:t>
-                </a:r>
-                <a:r>
-                  <a:rPr lang="en-US" sz="1800" dirty="0" smtClean="0"/>
-                  <a:t>Three)+ </a:t>
-                </a:r>
-                <a14:m>
-                  <m:oMath xmlns:m="http://schemas.openxmlformats.org/officeDocument/2006/math">
-                    <m:acc>
-                      <m:accPr>
-                        <m:chr m:val="̂"/>
-                        <m:ctrlPr>
-                          <a:rPr lang="el-GR" sz="1800" i="1" dirty="0">
-                            <a:latin typeface="Cambria Math" panose="02040503050406030204" pitchFamily="18" charset="0"/>
-                          </a:rPr>
-                        </m:ctrlPr>
-                      </m:accPr>
-                      <m:e>
-                        <m:r>
-                          <a:rPr lang="el-GR" sz="1800" i="1" dirty="0">
-                            <a:latin typeface="Cambria Math" panose="02040503050406030204" pitchFamily="18" charset="0"/>
-                          </a:rPr>
-                          <m:t>𝛽</m:t>
-                        </m:r>
-                        <m:r>
-                          <a:rPr lang="en-US" sz="1800" i="1" dirty="0">
-                            <a:latin typeface="Cambria Math" panose="02040503050406030204" pitchFamily="18" charset="0"/>
-                          </a:rPr>
-                          <m:t>2</m:t>
-                        </m:r>
-                      </m:e>
-                    </m:acc>
-                  </m:oMath>
-                </a14:m>
-                <a:r>
-                  <a:rPr lang="en-US" sz="1800"/>
-                  <a:t>* Condition (FTY vs Blank), </a:t>
-                </a:r>
-                <a14:m>
-                  <m:oMath xmlns:m="http://schemas.openxmlformats.org/officeDocument/2006/math">
-                    <m:acc>
-                      <m:accPr>
-                        <m:chr m:val="̂"/>
-                        <m:ctrlPr>
-                          <a:rPr lang="el-GR" sz="1800" i="1" dirty="0">
-                            <a:latin typeface="Cambria Math" panose="02040503050406030204" pitchFamily="18" charset="0"/>
-                          </a:rPr>
-                        </m:ctrlPr>
-                      </m:accPr>
-                      <m:e>
-                        <m:r>
-                          <a:rPr lang="en-US" sz="1800" b="0" i="1" dirty="0" smtClean="0">
-                            <a:latin typeface="Cambria Math" panose="02040503050406030204" pitchFamily="18" charset="0"/>
-                          </a:rPr>
-                          <m:t>(</m:t>
-                        </m:r>
-                        <m:r>
-                          <a:rPr lang="el-GR" sz="1800" i="1" dirty="0">
-                            <a:latin typeface="Cambria Math" panose="02040503050406030204" pitchFamily="18" charset="0"/>
-                          </a:rPr>
-                          <m:t>𝛽</m:t>
-                        </m:r>
-                        <m:r>
-                          <a:rPr lang="en-US" sz="1800" i="1" dirty="0">
-                            <a:latin typeface="Cambria Math" panose="02040503050406030204" pitchFamily="18" charset="0"/>
-                          </a:rPr>
-                          <m:t>1</m:t>
-                        </m:r>
-                      </m:e>
-                    </m:acc>
-                  </m:oMath>
-                </a14:m>
-                <a:r>
-                  <a:rPr lang="en-US" sz="1800" dirty="0"/>
-                  <a:t> +  </a:t>
-                </a:r>
-                <a14:m>
-                  <m:oMath xmlns:m="http://schemas.openxmlformats.org/officeDocument/2006/math">
-                    <m:acc>
-                      <m:accPr>
-                        <m:chr m:val="̂"/>
-                        <m:ctrlPr>
-                          <a:rPr lang="el-GR" sz="1800" i="1" dirty="0">
-                            <a:latin typeface="Cambria Math" panose="02040503050406030204" pitchFamily="18" charset="0"/>
-                          </a:rPr>
-                        </m:ctrlPr>
-                      </m:accPr>
-                      <m:e>
-                        <m:r>
-                          <a:rPr lang="el-GR" sz="1800" i="1" dirty="0">
-                            <a:latin typeface="Cambria Math" panose="02040503050406030204" pitchFamily="18" charset="0"/>
-                          </a:rPr>
-                          <m:t>𝛽</m:t>
-                        </m:r>
-                        <m:r>
-                          <a:rPr lang="en-US" sz="1800" i="1" dirty="0">
-                            <a:latin typeface="Cambria Math" panose="02040503050406030204" pitchFamily="18" charset="0"/>
-                          </a:rPr>
-                          <m:t>2</m:t>
-                        </m:r>
-                      </m:e>
-                    </m:acc>
-                  </m:oMath>
-                </a14:m>
-                <a:r>
-                  <a:rPr lang="en-US" sz="1800" dirty="0" smtClean="0"/>
-                  <a:t> ≠ 0)</a:t>
-                </a:r>
-                <a:endParaRPr lang="en-US" sz="1800" dirty="0"/>
-              </a:p>
-              <a:p>
-                <a:pPr marL="457200" lvl="1" indent="0">
-                  <a:buNone/>
-                </a:pPr>
-                <a:endParaRPr lang="en-US" sz="1800" dirty="0"/>
-              </a:p>
-              <a:p>
-                <a:pPr marL="0" indent="0">
-                  <a:buNone/>
-                </a:pPr>
-                <a:r>
-                  <a:rPr lang="en-US" sz="1800" dirty="0"/>
-                  <a:t>Testing this hypothesis will tell us </a:t>
-                </a:r>
-                <a:r>
-                  <a:rPr lang="en-US" sz="1800" dirty="0" smtClean="0"/>
-                  <a:t>if a sample being in one group or another and being in one batch or another are contributing to differences in gene expression </a:t>
-                </a:r>
-              </a:p>
-              <a:p>
-                <a:pPr marL="0" indent="0">
-                  <a:buNone/>
-                </a:pPr>
-                <a:r>
-                  <a:rPr lang="en-US" sz="1800" dirty="0" smtClean="0"/>
-                  <a:t>Note: In results, the log-fold changes are only shown for the comparison specified, i.e. compared to group A, there is an x log fold change in expression in group B, though all comparisons made are available</a:t>
-                </a:r>
-              </a:p>
-            </p:txBody>
-          </p:sp>
-        </mc:Choice>
-        <mc:Fallback xmlns="">
-          <p:sp>
-            <p:nvSpPr>
-              <p:cNvPr id="3" name="Content Placeholder 2"/>
-              <p:cNvSpPr>
-                <a:spLocks noGrp="1" noRot="1" noChangeAspect="1" noMove="1" noResize="1" noEditPoints="1" noAdjustHandles="1" noChangeArrowheads="1" noChangeShapeType="1" noTextEdit="1"/>
-              </p:cNvSpPr>
-              <p:nvPr>
-                <p:ph idx="1"/>
-              </p:nvPr>
-            </p:nvSpPr>
-            <p:spPr>
-              <a:xfrm>
-                <a:off x="838200" y="1260987"/>
-                <a:ext cx="10515600" cy="4915976"/>
-              </a:xfrm>
-              <a:blipFill>
-                <a:blip r:embed="rId2"/>
-                <a:stretch>
-                  <a:fillRect l="-522" t="-1241" r="-406"/>
-                </a:stretch>
-              </a:blipFill>
-            </p:spPr>
-            <p:txBody>
-              <a:bodyPr/>
-              <a:lstStyle/>
-              <a:p>
-                <a:r>
-                  <a:rPr lang="en-US">
-                    <a:noFill/>
-                  </a:rPr>
-                  <a:t> </a:t>
-                </a:r>
-              </a:p>
-            </p:txBody>
-          </p:sp>
-        </mc:Fallback>
-      </mc:AlternateContent>
+      <p:sp>
+        <p:nvSpPr>
+          <p:cNvPr id="3" name="Content Placeholder 2"/>
+          <p:cNvSpPr>
+            <a:spLocks noGrp="1"/>
+          </p:cNvSpPr>
+          <p:nvPr>
+            <p:ph idx="1"/>
+          </p:nvPr>
+        </p:nvSpPr>
+        <p:spPr/>
+        <p:txBody>
+          <a:bodyPr>
+            <a:normAutofit/>
+          </a:bodyPr>
+          <a:lstStyle/>
+          <a:p>
+            <a:pPr marL="0" indent="0">
+              <a:buNone/>
+            </a:pPr>
+            <a:r>
+              <a:rPr lang="en-US" dirty="0"/>
+              <a:t>With DEG analysis using the Wald test we are looking to reject the idea that the variances (s) in two groups of samples are the same. </a:t>
+            </a:r>
+          </a:p>
+          <a:p>
+            <a:pPr marL="0" indent="0">
+              <a:buNone/>
+            </a:pPr>
+            <a:endParaRPr lang="en-US" dirty="0"/>
+          </a:p>
+          <a:p>
+            <a:pPr marL="457200" lvl="1" indent="0">
+              <a:buNone/>
+            </a:pPr>
+            <a:r>
+              <a:rPr lang="en-US" sz="2800" dirty="0"/>
+              <a:t>H</a:t>
+            </a:r>
+            <a:r>
+              <a:rPr lang="en-US" sz="1800" dirty="0"/>
+              <a:t>null</a:t>
+            </a:r>
+            <a:r>
+              <a:rPr lang="en-US" sz="2800" dirty="0"/>
+              <a:t>: s in group A = s in group B (no difference)</a:t>
+            </a:r>
+          </a:p>
+          <a:p>
+            <a:pPr marL="457200" lvl="1" indent="0">
+              <a:buNone/>
+            </a:pPr>
+            <a:r>
+              <a:rPr lang="en-US" sz="2800" dirty="0"/>
+              <a:t>H</a:t>
+            </a:r>
+            <a:r>
+              <a:rPr lang="en-US" sz="1600" dirty="0"/>
+              <a:t>alternative</a:t>
+            </a:r>
+            <a:r>
+              <a:rPr lang="en-US" sz="2800" dirty="0"/>
+              <a:t>: s in group A ≠ s in group B (difference)</a:t>
+            </a:r>
+          </a:p>
+          <a:p>
+            <a:pPr marL="457200" lvl="1" indent="0">
+              <a:buNone/>
+            </a:pPr>
+            <a:endParaRPr lang="en-US" sz="2000" dirty="0"/>
+          </a:p>
+          <a:p>
+            <a:pPr marL="0" indent="0">
+              <a:buNone/>
+            </a:pPr>
+            <a:r>
+              <a:rPr lang="en-US" dirty="0"/>
+              <a:t>Testing this hypothesis will tell us if the differences between the groups are statistically significant. Statistical significance is necessary but not sufficient for clinical significance.</a:t>
+            </a:r>
+          </a:p>
+        </p:txBody>
+      </p:sp>
     </p:spTree>
     <p:extLst>
       <p:ext uri="{BB962C8B-B14F-4D97-AF65-F5344CB8AC3E}">
-        <p14:creationId xmlns:p14="http://schemas.microsoft.com/office/powerpoint/2010/main" val="2513674168"/>
+        <p14:creationId xmlns:p14="http://schemas.microsoft.com/office/powerpoint/2010/main" val="645806486"/>
       </p:ext>
     </p:extLst>
   </p:cSld>
   <p:clrMapOvr>
     <a:masterClrMapping/>
   </p:clrMapOvr>
-  <p:timing>
-    <p:tnLst>
-      <p:par>
-        <p:cTn id="1" dur="indefinite" restart="never" nodeType="tmRoot"/>
-      </p:par>
-    </p:tnLst>
-  </p:timing>
 </p:sld>
 </file>
 

</xml_diff>

<commit_message>
changed top 10 to top 5 on C v B slide
</commit_message>
<xml_diff>
--- a/SSU11755_RNAseqsummary_01032020.pptx
+++ b/SSU11755_RNAseqsummary_01032020.pptx
@@ -3992,15 +3992,7 @@
           <a:p>
             <a:r>
               <a:rPr lang="en-US" dirty="0" smtClean="0"/>
-              <a:t>B vs A</a:t>
-            </a:r>
-            <a:r>
-              <a:rPr lang="en-US" dirty="0" smtClean="0"/>
-              <a:t>: </a:t>
-            </a:r>
-            <a:r>
-              <a:rPr lang="en-US" dirty="0" smtClean="0"/>
-              <a:t>Heat map</a:t>
+              <a:t>B vs A: Heat map</a:t>
             </a:r>
             <a:endParaRPr lang="en-US" dirty="0"/>
           </a:p>
@@ -4034,11 +4026,7 @@
             </a:pPr>
             <a:r>
               <a:rPr lang="en-US" dirty="0" smtClean="0"/>
-              <a:t>Color and intensity of the boxes represent changes of gene </a:t>
-            </a:r>
-            <a:r>
-              <a:rPr lang="en-US" dirty="0" smtClean="0"/>
-              <a:t>expression as quantified by row means of the normalized counts</a:t>
+              <a:t>Color and intensity of the boxes represent changes of gene expression as quantified by row means of the normalized counts</a:t>
             </a:r>
           </a:p>
           <a:p>
@@ -4050,7 +4038,6 @@
               <a:rPr lang="en-US" dirty="0" smtClean="0"/>
               <a:t>The genes listed are in decreasing order of the mean normalized counts across all samples</a:t>
             </a:r>
-            <a:endParaRPr lang="en-US" dirty="0" smtClean="0"/>
           </a:p>
           <a:p>
             <a:pPr marL="285750" indent="-285750">
@@ -4059,15 +4046,7 @@
             </a:pPr>
             <a:r>
               <a:rPr lang="en-US" dirty="0" smtClean="0"/>
-              <a:t>Red indicates log fold changes close to </a:t>
-            </a:r>
-            <a:r>
-              <a:rPr lang="en-US" dirty="0" smtClean="0"/>
-              <a:t>16 </a:t>
-            </a:r>
-            <a:r>
-              <a:rPr lang="en-US" dirty="0" smtClean="0"/>
-              <a:t>and blue indicates log fold changes close to 8 </a:t>
+              <a:t>Red indicates log fold changes close to 16 and blue indicates log fold changes close to 8 </a:t>
             </a:r>
           </a:p>
           <a:p>
@@ -4077,31 +4056,7 @@
             </a:pPr>
             <a:r>
               <a:rPr lang="en-US" dirty="0" smtClean="0"/>
-              <a:t>Samples are grouped by </a:t>
-            </a:r>
-            <a:r>
-              <a:rPr lang="en-US" dirty="0" smtClean="0"/>
-              <a:t>dose group</a:t>
-            </a:r>
-            <a:r>
-              <a:rPr lang="en-US" dirty="0" smtClean="0"/>
-              <a:t> </a:t>
-            </a:r>
-            <a:r>
-              <a:rPr lang="en-US" dirty="0" smtClean="0"/>
-              <a:t>for simplified visual comparison and appear to have </a:t>
-            </a:r>
-            <a:r>
-              <a:rPr lang="en-US" dirty="0" smtClean="0"/>
-              <a:t>somewhat</a:t>
-            </a:r>
-            <a:r>
-              <a:rPr lang="en-US" dirty="0" smtClean="0"/>
-              <a:t> </a:t>
-            </a:r>
-            <a:r>
-              <a:rPr lang="en-US" dirty="0" smtClean="0"/>
-              <a:t>consistent expression within site groups</a:t>
+              <a:t>Samples are grouped by dose group for simplified visual comparison and appear to have somewhat consistent expression within site groups</a:t>
             </a:r>
           </a:p>
           <a:p>
@@ -4727,15 +4682,7 @@
             </a:r>
             <a:r>
               <a:rPr lang="en-US" dirty="0" smtClean="0"/>
-              <a:t> vs A</a:t>
-            </a:r>
-            <a:r>
-              <a:rPr lang="en-US" dirty="0" smtClean="0"/>
-              <a:t>: </a:t>
-            </a:r>
-            <a:r>
-              <a:rPr lang="en-US" dirty="0" smtClean="0"/>
-              <a:t>Heat map</a:t>
+              <a:t> vs A: Heat map</a:t>
             </a:r>
             <a:endParaRPr lang="en-US" dirty="0"/>
           </a:p>
@@ -4769,11 +4716,7 @@
             </a:pPr>
             <a:r>
               <a:rPr lang="en-US" dirty="0" smtClean="0"/>
-              <a:t>Color and intensity of the boxes represent changes of gene </a:t>
-            </a:r>
-            <a:r>
-              <a:rPr lang="en-US" dirty="0" smtClean="0"/>
-              <a:t>expression as quantified by row means of the normalized counts</a:t>
+              <a:t>Color and intensity of the boxes represent changes of gene expression as quantified by row means of the normalized counts</a:t>
             </a:r>
           </a:p>
           <a:p>
@@ -4785,7 +4728,6 @@
               <a:rPr lang="en-US" dirty="0" smtClean="0"/>
               <a:t>The genes listed are in decreasing order of the mean normalized counts across all samples</a:t>
             </a:r>
-            <a:endParaRPr lang="en-US" dirty="0" smtClean="0"/>
           </a:p>
           <a:p>
             <a:pPr marL="285750" indent="-285750">
@@ -4794,15 +4736,7 @@
             </a:pPr>
             <a:r>
               <a:rPr lang="en-US" dirty="0" smtClean="0"/>
-              <a:t>Red indicates log fold changes close to </a:t>
-            </a:r>
-            <a:r>
-              <a:rPr lang="en-US" dirty="0" smtClean="0"/>
-              <a:t>16 </a:t>
-            </a:r>
-            <a:r>
-              <a:rPr lang="en-US" dirty="0" smtClean="0"/>
-              <a:t>and blue indicates log fold changes close to 8 </a:t>
+              <a:t>Red indicates log fold changes close to 16 and blue indicates log fold changes close to 8 </a:t>
             </a:r>
           </a:p>
           <a:p>
@@ -4812,31 +4746,7 @@
             </a:pPr>
             <a:r>
               <a:rPr lang="en-US" dirty="0" smtClean="0"/>
-              <a:t>Samples are grouped by </a:t>
-            </a:r>
-            <a:r>
-              <a:rPr lang="en-US" dirty="0" smtClean="0"/>
-              <a:t>dose group</a:t>
-            </a:r>
-            <a:r>
-              <a:rPr lang="en-US" dirty="0" smtClean="0"/>
-              <a:t> </a:t>
-            </a:r>
-            <a:r>
-              <a:rPr lang="en-US" dirty="0" smtClean="0"/>
-              <a:t>for simplified visual comparison and appear to have </a:t>
-            </a:r>
-            <a:r>
-              <a:rPr lang="en-US" dirty="0" smtClean="0"/>
-              <a:t>somewhat</a:t>
-            </a:r>
-            <a:r>
-              <a:rPr lang="en-US" dirty="0" smtClean="0"/>
-              <a:t> </a:t>
-            </a:r>
-            <a:r>
-              <a:rPr lang="en-US" dirty="0" smtClean="0"/>
-              <a:t>consistent expression within site groups</a:t>
+              <a:t>Samples are grouped by dose group for simplified visual comparison and appear to have somewhat consistent expression within site groups</a:t>
             </a:r>
           </a:p>
           <a:p>
@@ -5236,8 +5146,16 @@
               <a:t>Top </a:t>
             </a:r>
             <a:r>
+              <a:rPr lang="en-US" sz="1800" dirty="0"/>
+              <a:t>5</a:t>
+            </a:r>
+            <a:r>
               <a:rPr lang="en-US" sz="1800" dirty="0" smtClean="0"/>
-              <a:t>10 DE </a:t>
+              <a:t> </a:t>
+            </a:r>
+            <a:r>
+              <a:rPr lang="en-US" sz="1800" dirty="0" smtClean="0"/>
+              <a:t>DE </a:t>
             </a:r>
             <a:r>
               <a:rPr lang="en-US" sz="1800" dirty="0"/>
@@ -5744,15 +5662,7 @@
             </a:r>
             <a:r>
               <a:rPr lang="en-US" dirty="0" smtClean="0"/>
-              <a:t> vs B</a:t>
-            </a:r>
-            <a:r>
-              <a:rPr lang="en-US" dirty="0" smtClean="0"/>
-              <a:t>: </a:t>
-            </a:r>
-            <a:r>
-              <a:rPr lang="en-US" dirty="0" smtClean="0"/>
-              <a:t>Heat map</a:t>
+              <a:t> vs B: Heat map</a:t>
             </a:r>
             <a:endParaRPr lang="en-US" dirty="0"/>
           </a:p>
@@ -5786,11 +5696,7 @@
             </a:pPr>
             <a:r>
               <a:rPr lang="en-US" dirty="0" smtClean="0"/>
-              <a:t>Color and intensity of the boxes represent changes of gene </a:t>
-            </a:r>
-            <a:r>
-              <a:rPr lang="en-US" dirty="0" smtClean="0"/>
-              <a:t>expression as quantified by row means of the normalized counts</a:t>
+              <a:t>Color and intensity of the boxes represent changes of gene expression as quantified by row means of the normalized counts</a:t>
             </a:r>
           </a:p>
           <a:p>
@@ -5802,7 +5708,6 @@
               <a:rPr lang="en-US" dirty="0" smtClean="0"/>
               <a:t>The genes listed are in decreasing order of the mean normalized counts across all samples</a:t>
             </a:r>
-            <a:endParaRPr lang="en-US" dirty="0" smtClean="0"/>
           </a:p>
           <a:p>
             <a:pPr marL="285750" indent="-285750">
@@ -5811,15 +5716,7 @@
             </a:pPr>
             <a:r>
               <a:rPr lang="en-US" dirty="0" smtClean="0"/>
-              <a:t>Red indicates log fold changes close to </a:t>
-            </a:r>
-            <a:r>
-              <a:rPr lang="en-US" dirty="0" smtClean="0"/>
-              <a:t>16 </a:t>
-            </a:r>
-            <a:r>
-              <a:rPr lang="en-US" dirty="0" smtClean="0"/>
-              <a:t>and blue indicates log fold changes close to 8 </a:t>
+              <a:t>Red indicates log fold changes close to 16 and blue indicates log fold changes close to 8 </a:t>
             </a:r>
           </a:p>
           <a:p>
@@ -5829,31 +5726,7 @@
             </a:pPr>
             <a:r>
               <a:rPr lang="en-US" dirty="0" smtClean="0"/>
-              <a:t>Samples are grouped by </a:t>
-            </a:r>
-            <a:r>
-              <a:rPr lang="en-US" dirty="0" smtClean="0"/>
-              <a:t>dose group</a:t>
-            </a:r>
-            <a:r>
-              <a:rPr lang="en-US" dirty="0" smtClean="0"/>
-              <a:t> </a:t>
-            </a:r>
-            <a:r>
-              <a:rPr lang="en-US" dirty="0" smtClean="0"/>
-              <a:t>for simplified visual comparison and appear to have </a:t>
-            </a:r>
-            <a:r>
-              <a:rPr lang="en-US" dirty="0" smtClean="0"/>
-              <a:t>somewhat</a:t>
-            </a:r>
-            <a:r>
-              <a:rPr lang="en-US" dirty="0" smtClean="0"/>
-              <a:t> </a:t>
-            </a:r>
-            <a:r>
-              <a:rPr lang="en-US" dirty="0" smtClean="0"/>
-              <a:t>consistent expression within site groups</a:t>
+              <a:t>Samples are grouped by dose group for simplified visual comparison and appear to have somewhat consistent expression within site groups</a:t>
             </a:r>
           </a:p>
           <a:p>

</xml_diff>

<commit_message>
updated heatmaps to sort by FDR
</commit_message>
<xml_diff>
--- a/SSU11755_RNAseqsummary_01032020.pptx
+++ b/SSU11755_RNAseqsummary_01032020.pptx
@@ -19,15 +19,17 @@
     <p:sldId id="287" r:id="rId13"/>
     <p:sldId id="284" r:id="rId14"/>
     <p:sldId id="294" r:id="rId15"/>
-    <p:sldId id="286" r:id="rId16"/>
-    <p:sldId id="288" r:id="rId17"/>
-    <p:sldId id="296" r:id="rId18"/>
-    <p:sldId id="291" r:id="rId19"/>
-    <p:sldId id="292" r:id="rId20"/>
-    <p:sldId id="297" r:id="rId21"/>
-    <p:sldId id="290" r:id="rId22"/>
-    <p:sldId id="267" r:id="rId23"/>
-    <p:sldId id="274" r:id="rId24"/>
+    <p:sldId id="298" r:id="rId16"/>
+    <p:sldId id="299" r:id="rId17"/>
+    <p:sldId id="286" r:id="rId18"/>
+    <p:sldId id="288" r:id="rId19"/>
+    <p:sldId id="296" r:id="rId20"/>
+    <p:sldId id="291" r:id="rId21"/>
+    <p:sldId id="292" r:id="rId22"/>
+    <p:sldId id="297" r:id="rId23"/>
+    <p:sldId id="290" r:id="rId24"/>
+    <p:sldId id="267" r:id="rId25"/>
+    <p:sldId id="274" r:id="rId26"/>
   </p:sldIdLst>
   <p:sldSz cx="12192000" cy="6858000"/>
   <p:notesSz cx="6858000" cy="9144000"/>
@@ -263,7 +265,7 @@
           <a:p>
             <a:fld id="{6B21E9B1-338B-4FB0-9226-2AB6509D5E61}" type="datetimeFigureOut">
               <a:rPr lang="en-US" smtClean="0"/>
-              <a:t>1/3/2020</a:t>
+              <a:t>1/21/2020</a:t>
             </a:fld>
             <a:endParaRPr lang="en-US"/>
           </a:p>
@@ -431,7 +433,7 @@
           <a:p>
             <a:fld id="{6B21E9B1-338B-4FB0-9226-2AB6509D5E61}" type="datetimeFigureOut">
               <a:rPr lang="en-US" smtClean="0"/>
-              <a:t>1/3/2020</a:t>
+              <a:t>1/21/2020</a:t>
             </a:fld>
             <a:endParaRPr lang="en-US"/>
           </a:p>
@@ -609,7 +611,7 @@
           <a:p>
             <a:fld id="{6B21E9B1-338B-4FB0-9226-2AB6509D5E61}" type="datetimeFigureOut">
               <a:rPr lang="en-US" smtClean="0"/>
-              <a:t>1/3/2020</a:t>
+              <a:t>1/21/2020</a:t>
             </a:fld>
             <a:endParaRPr lang="en-US"/>
           </a:p>
@@ -777,7 +779,7 @@
           <a:p>
             <a:fld id="{6B21E9B1-338B-4FB0-9226-2AB6509D5E61}" type="datetimeFigureOut">
               <a:rPr lang="en-US" smtClean="0"/>
-              <a:t>1/3/2020</a:t>
+              <a:t>1/21/2020</a:t>
             </a:fld>
             <a:endParaRPr lang="en-US"/>
           </a:p>
@@ -1022,7 +1024,7 @@
           <a:p>
             <a:fld id="{6B21E9B1-338B-4FB0-9226-2AB6509D5E61}" type="datetimeFigureOut">
               <a:rPr lang="en-US" smtClean="0"/>
-              <a:t>1/3/2020</a:t>
+              <a:t>1/21/2020</a:t>
             </a:fld>
             <a:endParaRPr lang="en-US"/>
           </a:p>
@@ -1251,7 +1253,7 @@
           <a:p>
             <a:fld id="{6B21E9B1-338B-4FB0-9226-2AB6509D5E61}" type="datetimeFigureOut">
               <a:rPr lang="en-US" smtClean="0"/>
-              <a:t>1/3/2020</a:t>
+              <a:t>1/21/2020</a:t>
             </a:fld>
             <a:endParaRPr lang="en-US"/>
           </a:p>
@@ -1615,7 +1617,7 @@
           <a:p>
             <a:fld id="{6B21E9B1-338B-4FB0-9226-2AB6509D5E61}" type="datetimeFigureOut">
               <a:rPr lang="en-US" smtClean="0"/>
-              <a:t>1/3/2020</a:t>
+              <a:t>1/21/2020</a:t>
             </a:fld>
             <a:endParaRPr lang="en-US"/>
           </a:p>
@@ -1732,7 +1734,7 @@
           <a:p>
             <a:fld id="{6B21E9B1-338B-4FB0-9226-2AB6509D5E61}" type="datetimeFigureOut">
               <a:rPr lang="en-US" smtClean="0"/>
-              <a:t>1/3/2020</a:t>
+              <a:t>1/21/2020</a:t>
             </a:fld>
             <a:endParaRPr lang="en-US"/>
           </a:p>
@@ -1827,7 +1829,7 @@
           <a:p>
             <a:fld id="{6B21E9B1-338B-4FB0-9226-2AB6509D5E61}" type="datetimeFigureOut">
               <a:rPr lang="en-US" smtClean="0"/>
-              <a:t>1/3/2020</a:t>
+              <a:t>1/21/2020</a:t>
             </a:fld>
             <a:endParaRPr lang="en-US"/>
           </a:p>
@@ -2102,7 +2104,7 @@
           <a:p>
             <a:fld id="{6B21E9B1-338B-4FB0-9226-2AB6509D5E61}" type="datetimeFigureOut">
               <a:rPr lang="en-US" smtClean="0"/>
-              <a:t>1/3/2020</a:t>
+              <a:t>1/21/2020</a:t>
             </a:fld>
             <a:endParaRPr lang="en-US"/>
           </a:p>
@@ -2354,7 +2356,7 @@
           <a:p>
             <a:fld id="{6B21E9B1-338B-4FB0-9226-2AB6509D5E61}" type="datetimeFigureOut">
               <a:rPr lang="en-US" smtClean="0"/>
-              <a:t>1/3/2020</a:t>
+              <a:t>1/21/2020</a:t>
             </a:fld>
             <a:endParaRPr lang="en-US"/>
           </a:p>
@@ -2565,7 +2567,7 @@
           <a:p>
             <a:fld id="{6B21E9B1-338B-4FB0-9226-2AB6509D5E61}" type="datetimeFigureOut">
               <a:rPr lang="en-US" smtClean="0"/>
-              <a:t>1/3/2020</a:t>
+              <a:t>1/21/2020</a:t>
             </a:fld>
             <a:endParaRPr lang="en-US"/>
           </a:p>
@@ -4006,8 +4008,8 @@
         </p:nvSpPr>
         <p:spPr>
           <a:xfrm>
-            <a:off x="898071" y="2018792"/>
-            <a:ext cx="4726983" cy="4247317"/>
+            <a:off x="705031" y="1455079"/>
+            <a:ext cx="4726983" cy="4031873"/>
           </a:xfrm>
           <a:prstGeom prst="rect">
             <a:avLst/>
@@ -4025,9 +4027,20 @@
               <a:buChar char="•"/>
             </a:pPr>
             <a:r>
-              <a:rPr lang="en-US" dirty="0" smtClean="0"/>
-              <a:t>Color and intensity of the boxes represent changes of gene expression as quantified by row means of the normalized counts</a:t>
-            </a:r>
+              <a:rPr lang="en-US" sz="1600" dirty="0"/>
+              <a:t>Color and intensity of the boxes represent counts transformed using a variance stabilizing transformation (</a:t>
+            </a:r>
+            <a:r>
+              <a:rPr lang="en-US" sz="1600" dirty="0" err="1"/>
+              <a:t>vst</a:t>
+            </a:r>
+            <a:r>
+              <a:rPr lang="en-US" sz="1600" dirty="0"/>
+              <a:t>) which is similar to a log2 transformation but accounts for the sampling variability of genes with low counts</a:t>
+            </a:r>
+          </a:p>
+          <a:p>
+            <a:endParaRPr lang="en-US" sz="1600" dirty="0"/>
           </a:p>
           <a:p>
             <a:pPr marL="285750" indent="-285750">
@@ -4035,8 +4048,40 @@
               <a:buChar char="•"/>
             </a:pPr>
             <a:r>
-              <a:rPr lang="en-US" dirty="0" smtClean="0"/>
-              <a:t>The genes listed are in decreasing order of the mean normalized counts across all samples</a:t>
+              <a:rPr lang="en-US" sz="1600" dirty="0"/>
+              <a:t>Red indicates </a:t>
+            </a:r>
+            <a:r>
+              <a:rPr lang="en-US" sz="1600" dirty="0" err="1"/>
+              <a:t>vst</a:t>
+            </a:r>
+            <a:r>
+              <a:rPr lang="en-US" sz="1600" dirty="0"/>
+              <a:t> transformed counts closer to </a:t>
+            </a:r>
+            <a:r>
+              <a:rPr lang="en-US" sz="1600" dirty="0" smtClean="0"/>
+              <a:t>16 </a:t>
+            </a:r>
+            <a:r>
+              <a:rPr lang="en-US" sz="1600" dirty="0"/>
+              <a:t>and blue indicates </a:t>
+            </a:r>
+            <a:r>
+              <a:rPr lang="en-US" sz="1600" dirty="0" err="1"/>
+              <a:t>vst</a:t>
+            </a:r>
+            <a:r>
+              <a:rPr lang="en-US" sz="1600" dirty="0"/>
+              <a:t> transformed counts </a:t>
+            </a:r>
+            <a:r>
+              <a:rPr lang="en-US" sz="1600" dirty="0" smtClean="0"/>
+              <a:t>closer </a:t>
+            </a:r>
+            <a:r>
+              <a:rPr lang="en-US" sz="1600" dirty="0"/>
+              <a:t>to 8</a:t>
             </a:r>
           </a:p>
           <a:p>
@@ -4044,10 +4089,7 @@
               <a:buFont typeface="Arial" panose="020B0604020202020204" pitchFamily="34" charset="0"/>
               <a:buChar char="•"/>
             </a:pPr>
-            <a:r>
-              <a:rPr lang="en-US" dirty="0" smtClean="0"/>
-              <a:t>Red indicates log fold changes close to 16 and blue indicates log fold changes close to 8 </a:t>
-            </a:r>
+            <a:endParaRPr lang="en-US" sz="1600" dirty="0"/>
           </a:p>
           <a:p>
             <a:pPr marL="285750" indent="-285750">
@@ -4055,9 +4097,12 @@
               <a:buChar char="•"/>
             </a:pPr>
             <a:r>
-              <a:rPr lang="en-US" dirty="0" smtClean="0"/>
-              <a:t>Samples are grouped by dose group for simplified visual comparison and appear to have somewhat consistent expression within site groups</a:t>
-            </a:r>
+              <a:rPr lang="en-US" sz="1600" dirty="0"/>
+              <a:t>Genes are sorted by lowest adjusted p-value (FDR)</a:t>
+            </a:r>
+          </a:p>
+          <a:p>
+            <a:endParaRPr lang="en-US" sz="1600" dirty="0"/>
           </a:p>
           <a:p>
             <a:pPr marL="285750" indent="-285750">
@@ -4065,16 +4110,20 @@
               <a:buChar char="•"/>
             </a:pPr>
             <a:r>
-              <a:rPr lang="en-US" dirty="0" smtClean="0"/>
-              <a:t>As expected, both concentrations are more similar to one another than they are to concentration of 0 </a:t>
-            </a:r>
-            <a:endParaRPr lang="en-US" dirty="0"/>
+              <a:rPr lang="en-US" sz="1600" dirty="0"/>
+              <a:t>Samples are grouped by </a:t>
+            </a:r>
+            <a:r>
+              <a:rPr lang="en-US" sz="1600" dirty="0" smtClean="0"/>
+              <a:t>concentration and it is evident that the two viral concentrations are more similar to each other than they are to the naïve concentration</a:t>
+            </a:r>
+            <a:endParaRPr lang="en-US" sz="1600" dirty="0"/>
           </a:p>
         </p:txBody>
       </p:sp>
       <p:pic>
         <p:nvPicPr>
-          <p:cNvPr id="4" name="Picture 3"/>
+          <p:cNvPr id="3" name="Picture 2"/>
           <p:cNvPicPr>
             <a:picLocks noChangeAspect="1"/>
           </p:cNvPicPr>
@@ -4094,8 +4143,8 @@
         </p:blipFill>
         <p:spPr>
           <a:xfrm>
-            <a:off x="6381744" y="767437"/>
-            <a:ext cx="5715012" cy="5715012"/>
+            <a:off x="6512561" y="703906"/>
+            <a:ext cx="5234436" cy="5897306"/>
           </a:xfrm>
           <a:prstGeom prst="rect">
             <a:avLst/>
@@ -4116,6 +4165,414 @@
 </file>
 
 <file path=ppt/slides/slide15.xml><?xml version="1.0" encoding="utf-8"?>
+<p:sld xmlns:a="http://schemas.openxmlformats.org/drawingml/2006/main" xmlns:r="http://schemas.openxmlformats.org/officeDocument/2006/relationships" xmlns:p="http://schemas.openxmlformats.org/presentationml/2006/main">
+  <p:cSld>
+    <p:spTree>
+      <p:nvGrpSpPr>
+        <p:cNvPr id="1" name=""/>
+        <p:cNvGrpSpPr/>
+        <p:nvPr/>
+      </p:nvGrpSpPr>
+      <p:grpSpPr>
+        <a:xfrm>
+          <a:off x="0" y="0"/>
+          <a:ext cx="0" cy="0"/>
+          <a:chOff x="0" y="0"/>
+          <a:chExt cx="0" cy="0"/>
+        </a:xfrm>
+      </p:grpSpPr>
+      <p:sp>
+        <p:nvSpPr>
+          <p:cNvPr id="2" name="Title 1"/>
+          <p:cNvSpPr>
+            <a:spLocks noGrp="1"/>
+          </p:cNvSpPr>
+          <p:nvPr>
+            <p:ph type="title"/>
+          </p:nvPr>
+        </p:nvSpPr>
+        <p:spPr/>
+        <p:txBody>
+          <a:bodyPr/>
+          <a:lstStyle/>
+          <a:p>
+            <a:r>
+              <a:rPr lang="en-US" dirty="0"/>
+              <a:t>C</a:t>
+            </a:r>
+            <a:r>
+              <a:rPr lang="en-US" dirty="0" smtClean="0"/>
+              <a:t> </a:t>
+            </a:r>
+            <a:r>
+              <a:rPr lang="en-US" dirty="0" smtClean="0"/>
+              <a:t>vs A: Heat map</a:t>
+            </a:r>
+            <a:endParaRPr lang="en-US" dirty="0"/>
+          </a:p>
+        </p:txBody>
+      </p:sp>
+      <p:sp>
+        <p:nvSpPr>
+          <p:cNvPr id="5" name="TextBox 4"/>
+          <p:cNvSpPr txBox="1"/>
+          <p:nvPr/>
+        </p:nvSpPr>
+        <p:spPr>
+          <a:xfrm>
+            <a:off x="838200" y="1530593"/>
+            <a:ext cx="4726983" cy="5078313"/>
+          </a:xfrm>
+          <a:prstGeom prst="rect">
+            <a:avLst/>
+          </a:prstGeom>
+          <a:noFill/>
+        </p:spPr>
+        <p:txBody>
+          <a:bodyPr wrap="square" rtlCol="0">
+            <a:spAutoFit/>
+          </a:bodyPr>
+          <a:lstStyle/>
+          <a:p>
+            <a:pPr marL="285750" indent="-285750">
+              <a:buFont typeface="Arial" panose="020B0604020202020204" pitchFamily="34" charset="0"/>
+              <a:buChar char="•"/>
+            </a:pPr>
+            <a:r>
+              <a:rPr lang="en-US" dirty="0"/>
+              <a:t>Color and intensity of the boxes represent counts transformed using a variance stabilizing transformation (</a:t>
+            </a:r>
+            <a:r>
+              <a:rPr lang="en-US" dirty="0" err="1"/>
+              <a:t>vst</a:t>
+            </a:r>
+            <a:r>
+              <a:rPr lang="en-US" dirty="0"/>
+              <a:t>) which is similar to a log2 transformation but accounts for the sampling variability of genes with low counts</a:t>
+            </a:r>
+          </a:p>
+          <a:p>
+            <a:endParaRPr lang="en-US" dirty="0"/>
+          </a:p>
+          <a:p>
+            <a:pPr marL="285750" indent="-285750">
+              <a:buFont typeface="Arial" panose="020B0604020202020204" pitchFamily="34" charset="0"/>
+              <a:buChar char="•"/>
+            </a:pPr>
+            <a:r>
+              <a:rPr lang="en-US" dirty="0"/>
+              <a:t>Red indicates </a:t>
+            </a:r>
+            <a:r>
+              <a:rPr lang="en-US" dirty="0" err="1"/>
+              <a:t>vst</a:t>
+            </a:r>
+            <a:r>
+              <a:rPr lang="en-US" dirty="0"/>
+              <a:t> transformed counts closer to 16 and blue indicates </a:t>
+            </a:r>
+            <a:r>
+              <a:rPr lang="en-US" dirty="0" err="1"/>
+              <a:t>vst</a:t>
+            </a:r>
+            <a:r>
+              <a:rPr lang="en-US" dirty="0"/>
+              <a:t> transformed counts closer to 8</a:t>
+            </a:r>
+          </a:p>
+          <a:p>
+            <a:pPr marL="285750" indent="-285750">
+              <a:buFont typeface="Arial" panose="020B0604020202020204" pitchFamily="34" charset="0"/>
+              <a:buChar char="•"/>
+            </a:pPr>
+            <a:endParaRPr lang="en-US" dirty="0"/>
+          </a:p>
+          <a:p>
+            <a:pPr marL="285750" indent="-285750">
+              <a:buFont typeface="Arial" panose="020B0604020202020204" pitchFamily="34" charset="0"/>
+              <a:buChar char="•"/>
+            </a:pPr>
+            <a:r>
+              <a:rPr lang="en-US" dirty="0"/>
+              <a:t>Genes are sorted by lowest adjusted p-value (FDR)</a:t>
+            </a:r>
+          </a:p>
+          <a:p>
+            <a:endParaRPr lang="en-US" dirty="0"/>
+          </a:p>
+          <a:p>
+            <a:pPr marL="285750" indent="-285750">
+              <a:buFont typeface="Arial" panose="020B0604020202020204" pitchFamily="34" charset="0"/>
+              <a:buChar char="•"/>
+            </a:pPr>
+            <a:r>
+              <a:rPr lang="en-US" dirty="0"/>
+              <a:t>Samples are grouped by concentration and it is evident that the two viral concentrations are more similar to each other than they are to the naïve concentration</a:t>
+            </a:r>
+            <a:endParaRPr lang="en-US" dirty="0"/>
+          </a:p>
+        </p:txBody>
+      </p:sp>
+      <p:pic>
+        <p:nvPicPr>
+          <p:cNvPr id="3" name="Picture 2"/>
+          <p:cNvPicPr>
+            <a:picLocks noChangeAspect="1"/>
+          </p:cNvPicPr>
+          <p:nvPr/>
+        </p:nvPicPr>
+        <p:blipFill>
+          <a:blip r:embed="rId2" cstate="print">
+            <a:extLst>
+              <a:ext uri="{28A0092B-C50C-407E-A947-70E740481C1C}">
+                <a14:useLocalDpi xmlns:a14="http://schemas.microsoft.com/office/drawing/2010/main" val="0"/>
+              </a:ext>
+            </a:extLst>
+          </a:blip>
+          <a:stretch>
+            <a:fillRect/>
+          </a:stretch>
+        </p:blipFill>
+        <p:spPr>
+          <a:xfrm>
+            <a:off x="6634481" y="814778"/>
+            <a:ext cx="5000756" cy="5634033"/>
+          </a:xfrm>
+          <a:prstGeom prst="rect">
+            <a:avLst/>
+          </a:prstGeom>
+        </p:spPr>
+      </p:pic>
+    </p:spTree>
+    <p:extLst>
+      <p:ext uri="{BB962C8B-B14F-4D97-AF65-F5344CB8AC3E}">
+        <p14:creationId xmlns:p14="http://schemas.microsoft.com/office/powerpoint/2010/main" val="2167058792"/>
+      </p:ext>
+    </p:extLst>
+  </p:cSld>
+  <p:clrMapOvr>
+    <a:masterClrMapping/>
+  </p:clrMapOvr>
+</p:sld>
+</file>
+
+<file path=ppt/slides/slide16.xml><?xml version="1.0" encoding="utf-8"?>
+<p:sld xmlns:a="http://schemas.openxmlformats.org/drawingml/2006/main" xmlns:r="http://schemas.openxmlformats.org/officeDocument/2006/relationships" xmlns:p="http://schemas.openxmlformats.org/presentationml/2006/main">
+  <p:cSld>
+    <p:spTree>
+      <p:nvGrpSpPr>
+        <p:cNvPr id="1" name=""/>
+        <p:cNvGrpSpPr/>
+        <p:nvPr/>
+      </p:nvGrpSpPr>
+      <p:grpSpPr>
+        <a:xfrm>
+          <a:off x="0" y="0"/>
+          <a:ext cx="0" cy="0"/>
+          <a:chOff x="0" y="0"/>
+          <a:chExt cx="0" cy="0"/>
+        </a:xfrm>
+      </p:grpSpPr>
+      <p:sp>
+        <p:nvSpPr>
+          <p:cNvPr id="2" name="Title 1"/>
+          <p:cNvSpPr>
+            <a:spLocks noGrp="1"/>
+          </p:cNvSpPr>
+          <p:nvPr>
+            <p:ph type="title"/>
+          </p:nvPr>
+        </p:nvSpPr>
+        <p:spPr/>
+        <p:txBody>
+          <a:bodyPr/>
+          <a:lstStyle/>
+          <a:p>
+            <a:r>
+              <a:rPr lang="en-US" dirty="0"/>
+              <a:t>C</a:t>
+            </a:r>
+            <a:r>
+              <a:rPr lang="en-US" dirty="0" smtClean="0"/>
+              <a:t> </a:t>
+            </a:r>
+            <a:r>
+              <a:rPr lang="en-US" dirty="0" smtClean="0"/>
+              <a:t>vs </a:t>
+            </a:r>
+            <a:r>
+              <a:rPr lang="en-US" dirty="0" smtClean="0"/>
+              <a:t>B: </a:t>
+            </a:r>
+            <a:r>
+              <a:rPr lang="en-US" dirty="0" smtClean="0"/>
+              <a:t>Heat map</a:t>
+            </a:r>
+            <a:endParaRPr lang="en-US" dirty="0"/>
+          </a:p>
+        </p:txBody>
+      </p:sp>
+      <p:sp>
+        <p:nvSpPr>
+          <p:cNvPr id="5" name="TextBox 4"/>
+          <p:cNvSpPr txBox="1"/>
+          <p:nvPr/>
+        </p:nvSpPr>
+        <p:spPr>
+          <a:xfrm>
+            <a:off x="838200" y="1470152"/>
+            <a:ext cx="4726983" cy="5078313"/>
+          </a:xfrm>
+          <a:prstGeom prst="rect">
+            <a:avLst/>
+          </a:prstGeom>
+          <a:noFill/>
+        </p:spPr>
+        <p:txBody>
+          <a:bodyPr wrap="square" rtlCol="0">
+            <a:spAutoFit/>
+          </a:bodyPr>
+          <a:lstStyle/>
+          <a:p>
+            <a:pPr marL="285750" indent="-285750">
+              <a:buFont typeface="Arial" panose="020B0604020202020204" pitchFamily="34" charset="0"/>
+              <a:buChar char="•"/>
+            </a:pPr>
+            <a:r>
+              <a:rPr lang="en-US" dirty="0"/>
+              <a:t>Color and intensity of the boxes represent counts transformed using a variance stabilizing transformation (</a:t>
+            </a:r>
+            <a:r>
+              <a:rPr lang="en-US" dirty="0" err="1"/>
+              <a:t>vst</a:t>
+            </a:r>
+            <a:r>
+              <a:rPr lang="en-US" dirty="0"/>
+              <a:t>) which is similar to a log2 transformation but accounts for the sampling variability of genes with low counts</a:t>
+            </a:r>
+          </a:p>
+          <a:p>
+            <a:endParaRPr lang="en-US" dirty="0"/>
+          </a:p>
+          <a:p>
+            <a:pPr marL="285750" indent="-285750">
+              <a:buFont typeface="Arial" panose="020B0604020202020204" pitchFamily="34" charset="0"/>
+              <a:buChar char="•"/>
+            </a:pPr>
+            <a:r>
+              <a:rPr lang="en-US" dirty="0"/>
+              <a:t>Red indicates </a:t>
+            </a:r>
+            <a:r>
+              <a:rPr lang="en-US" dirty="0" err="1"/>
+              <a:t>vst</a:t>
+            </a:r>
+            <a:r>
+              <a:rPr lang="en-US" dirty="0"/>
+              <a:t> transformed counts closer to </a:t>
+            </a:r>
+            <a:r>
+              <a:rPr lang="en-US" dirty="0" smtClean="0"/>
+              <a:t>11 </a:t>
+            </a:r>
+            <a:r>
+              <a:rPr lang="en-US" dirty="0"/>
+              <a:t>and blue indicates </a:t>
+            </a:r>
+            <a:r>
+              <a:rPr lang="en-US" dirty="0" err="1"/>
+              <a:t>vst</a:t>
+            </a:r>
+            <a:r>
+              <a:rPr lang="en-US" dirty="0"/>
+              <a:t> transformed counts closer to 8</a:t>
+            </a:r>
+          </a:p>
+          <a:p>
+            <a:pPr marL="285750" indent="-285750">
+              <a:buFont typeface="Arial" panose="020B0604020202020204" pitchFamily="34" charset="0"/>
+              <a:buChar char="•"/>
+            </a:pPr>
+            <a:endParaRPr lang="en-US" dirty="0"/>
+          </a:p>
+          <a:p>
+            <a:pPr marL="285750" indent="-285750">
+              <a:buFont typeface="Arial" panose="020B0604020202020204" pitchFamily="34" charset="0"/>
+              <a:buChar char="•"/>
+            </a:pPr>
+            <a:r>
+              <a:rPr lang="en-US" dirty="0"/>
+              <a:t>Genes are sorted by lowest adjusted p-value (FDR)</a:t>
+            </a:r>
+          </a:p>
+          <a:p>
+            <a:endParaRPr lang="en-US" dirty="0"/>
+          </a:p>
+          <a:p>
+            <a:pPr marL="285750" indent="-285750">
+              <a:buFont typeface="Arial" panose="020B0604020202020204" pitchFamily="34" charset="0"/>
+              <a:buChar char="•"/>
+            </a:pPr>
+            <a:r>
+              <a:rPr lang="en-US" dirty="0"/>
+              <a:t>Samples are grouped by concentration and it is evident that the two viral concentrations are more similar to each other than they are to the </a:t>
+            </a:r>
+            <a:r>
+              <a:rPr lang="en-US"/>
+              <a:t>naïve </a:t>
+            </a:r>
+            <a:r>
+              <a:rPr lang="en-US" smtClean="0"/>
+              <a:t>concentration</a:t>
+            </a:r>
+            <a:endParaRPr lang="en-US" dirty="0"/>
+          </a:p>
+        </p:txBody>
+      </p:sp>
+      <p:pic>
+        <p:nvPicPr>
+          <p:cNvPr id="3" name="Picture 2"/>
+          <p:cNvPicPr>
+            <a:picLocks noChangeAspect="1"/>
+          </p:cNvPicPr>
+          <p:nvPr/>
+        </p:nvPicPr>
+        <p:blipFill>
+          <a:blip r:embed="rId2" cstate="print">
+            <a:extLst>
+              <a:ext uri="{28A0092B-C50C-407E-A947-70E740481C1C}">
+                <a14:useLocalDpi xmlns:a14="http://schemas.microsoft.com/office/drawing/2010/main" val="0"/>
+              </a:ext>
+            </a:extLst>
+          </a:blip>
+          <a:stretch>
+            <a:fillRect/>
+          </a:stretch>
+        </p:blipFill>
+        <p:spPr>
+          <a:xfrm>
+            <a:off x="6705601" y="791486"/>
+            <a:ext cx="5264916" cy="5931646"/>
+          </a:xfrm>
+          <a:prstGeom prst="rect">
+            <a:avLst/>
+          </a:prstGeom>
+        </p:spPr>
+      </p:pic>
+    </p:spTree>
+    <p:extLst>
+      <p:ext uri="{BB962C8B-B14F-4D97-AF65-F5344CB8AC3E}">
+        <p14:creationId xmlns:p14="http://schemas.microsoft.com/office/powerpoint/2010/main" val="4083030933"/>
+      </p:ext>
+    </p:extLst>
+  </p:cSld>
+  <p:clrMapOvr>
+    <a:masterClrMapping/>
+  </p:clrMapOvr>
+</p:sld>
+</file>
+
+<file path=ppt/slides/slide17.xml><?xml version="1.0" encoding="utf-8"?>
 <p:sld xmlns:a="http://schemas.openxmlformats.org/drawingml/2006/main" xmlns:r="http://schemas.openxmlformats.org/officeDocument/2006/relationships" xmlns:p="http://schemas.openxmlformats.org/presentationml/2006/main">
   <p:cSld>
     <p:spTree>
@@ -4364,7 +4821,7 @@
 </p:sld>
 </file>
 
-<file path=ppt/slides/slide16.xml><?xml version="1.0" encoding="utf-8"?>
+<file path=ppt/slides/slide18.xml><?xml version="1.0" encoding="utf-8"?>
 <p:sld xmlns:a="http://schemas.openxmlformats.org/drawingml/2006/main" xmlns:r="http://schemas.openxmlformats.org/officeDocument/2006/relationships" xmlns:p="http://schemas.openxmlformats.org/presentationml/2006/main">
   <p:cSld>
     <p:spTree>
@@ -4644,7 +5101,7 @@
 </p:sld>
 </file>
 
-<file path=ppt/slides/slide17.xml><?xml version="1.0" encoding="utf-8"?>
+<file path=ppt/slides/slide19.xml><?xml version="1.0" encoding="utf-8"?>
 <p:sld xmlns:a="http://schemas.openxmlformats.org/drawingml/2006/main" xmlns:r="http://schemas.openxmlformats.org/officeDocument/2006/relationships" xmlns:p="http://schemas.openxmlformats.org/presentationml/2006/main">
   <p:cSld>
     <p:spTree>
@@ -4805,7 +5262,296 @@
 </p:sld>
 </file>
 
-<file path=ppt/slides/slide18.xml><?xml version="1.0" encoding="utf-8"?>
+<file path=ppt/slides/slide2.xml><?xml version="1.0" encoding="utf-8"?>
+<p:sld xmlns:a="http://schemas.openxmlformats.org/drawingml/2006/main" xmlns:r="http://schemas.openxmlformats.org/officeDocument/2006/relationships" xmlns:p="http://schemas.openxmlformats.org/presentationml/2006/main">
+  <p:cSld>
+    <p:spTree>
+      <p:nvGrpSpPr>
+        <p:cNvPr id="1" name=""/>
+        <p:cNvGrpSpPr/>
+        <p:nvPr/>
+      </p:nvGrpSpPr>
+      <p:grpSpPr>
+        <a:xfrm>
+          <a:off x="0" y="0"/>
+          <a:ext cx="0" cy="0"/>
+          <a:chOff x="0" y="0"/>
+          <a:chExt cx="0" cy="0"/>
+        </a:xfrm>
+      </p:grpSpPr>
+      <p:sp>
+        <p:nvSpPr>
+          <p:cNvPr id="2" name="Title 1">
+            <a:extLst>
+              <a:ext uri="{FF2B5EF4-FFF2-40B4-BE49-F238E27FC236}">
+                <a16:creationId xmlns:a16="http://schemas.microsoft.com/office/drawing/2014/main" id="{3A2D132A-48CD-CA44-9040-8CD5E5DD4DEB}"/>
+              </a:ext>
+            </a:extLst>
+          </p:cNvPr>
+          <p:cNvSpPr>
+            <a:spLocks noGrp="1"/>
+          </p:cNvSpPr>
+          <p:nvPr>
+            <p:ph type="title"/>
+          </p:nvPr>
+        </p:nvSpPr>
+        <p:spPr/>
+        <p:txBody>
+          <a:bodyPr/>
+          <a:lstStyle/>
+          <a:p>
+            <a:r>
+              <a:rPr lang="en-US" dirty="0" err="1"/>
+              <a:t>RNASeq</a:t>
+            </a:r>
+            <a:r>
+              <a:rPr lang="en-US" dirty="0"/>
+              <a:t> Analysis Workflow</a:t>
+            </a:r>
+          </a:p>
+        </p:txBody>
+      </p:sp>
+      <p:sp>
+        <p:nvSpPr>
+          <p:cNvPr id="3" name="Content Placeholder 2">
+            <a:extLst>
+              <a:ext uri="{FF2B5EF4-FFF2-40B4-BE49-F238E27FC236}">
+                <a16:creationId xmlns:a16="http://schemas.microsoft.com/office/drawing/2014/main" id="{BC867114-6E4A-F345-9EBB-6E085C92DE33}"/>
+              </a:ext>
+            </a:extLst>
+          </p:cNvPr>
+          <p:cNvSpPr>
+            <a:spLocks noGrp="1"/>
+          </p:cNvSpPr>
+          <p:nvPr>
+            <p:ph idx="1"/>
+          </p:nvPr>
+        </p:nvSpPr>
+        <p:spPr/>
+        <p:txBody>
+          <a:bodyPr>
+            <a:normAutofit fontScale="92500" lnSpcReduction="20000"/>
+          </a:bodyPr>
+          <a:lstStyle/>
+          <a:p>
+            <a:pPr marL="571500" indent="-571500">
+              <a:buFont typeface="+mj-lt"/>
+              <a:buAutoNum type="romanUcPeriod"/>
+            </a:pPr>
+            <a:r>
+              <a:rPr lang="en-US" dirty="0"/>
+              <a:t>QC at .</a:t>
+            </a:r>
+            <a:r>
+              <a:rPr lang="en-US" dirty="0" err="1"/>
+              <a:t>fastq</a:t>
+            </a:r>
+            <a:r>
+              <a:rPr lang="en-US" dirty="0"/>
+              <a:t> stage</a:t>
+            </a:r>
+          </a:p>
+          <a:p>
+            <a:pPr marL="1028700" lvl="1" indent="-571500">
+              <a:buFont typeface="+mj-lt"/>
+              <a:buAutoNum type="romanUcPeriod"/>
+            </a:pPr>
+            <a:r>
+              <a:rPr lang="en-US" dirty="0" err="1"/>
+              <a:t>FastQC</a:t>
+            </a:r>
+            <a:r>
+              <a:rPr lang="en-US" dirty="0"/>
+              <a:t> , </a:t>
+            </a:r>
+            <a:r>
+              <a:rPr lang="en-US" dirty="0" err="1"/>
+              <a:t>Fastq</a:t>
+            </a:r>
+            <a:r>
+              <a:rPr lang="en-US" dirty="0"/>
+              <a:t>-Screen, </a:t>
+            </a:r>
+            <a:r>
+              <a:rPr lang="en-US" dirty="0" err="1"/>
+              <a:t>MultiQC</a:t>
+            </a:r>
+            <a:r>
+              <a:rPr lang="en-US" dirty="0"/>
+              <a:t>, &amp; </a:t>
+            </a:r>
+            <a:r>
+              <a:rPr lang="en-US" dirty="0" err="1"/>
+              <a:t>Trimmomatic</a:t>
+            </a:r>
+            <a:r>
+              <a:rPr lang="en-US" dirty="0"/>
+              <a:t> if necessary</a:t>
+            </a:r>
+          </a:p>
+          <a:p>
+            <a:pPr marL="571500" indent="-571500">
+              <a:buFont typeface="+mj-lt"/>
+              <a:buAutoNum type="romanUcPeriod"/>
+            </a:pPr>
+            <a:r>
+              <a:rPr lang="en-US" dirty="0"/>
+              <a:t>Alignment to reference genome </a:t>
+            </a:r>
+          </a:p>
+          <a:p>
+            <a:pPr marL="1028700" lvl="1" indent="-571500">
+              <a:buFont typeface="+mj-lt"/>
+              <a:buAutoNum type="romanUcPeriod"/>
+            </a:pPr>
+            <a:r>
+              <a:rPr lang="en-US" dirty="0"/>
+              <a:t>STAR – mm10 genome for </a:t>
+            </a:r>
+            <a:r>
+              <a:rPr lang="en-US" i="1" dirty="0"/>
+              <a:t>M. musculus</a:t>
+            </a:r>
+            <a:r>
+              <a:rPr lang="en-US" dirty="0"/>
+              <a:t>, UCSC</a:t>
+            </a:r>
+          </a:p>
+          <a:p>
+            <a:pPr marL="1028700" lvl="1" indent="-571500">
+              <a:buFont typeface="+mj-lt"/>
+              <a:buAutoNum type="romanUcPeriod"/>
+            </a:pPr>
+            <a:r>
+              <a:rPr lang="en-US" dirty="0"/>
+              <a:t>Sort and index .bam files</a:t>
+            </a:r>
+          </a:p>
+          <a:p>
+            <a:pPr marL="571500" indent="-571500">
+              <a:buFont typeface="+mj-lt"/>
+              <a:buAutoNum type="romanUcPeriod"/>
+            </a:pPr>
+            <a:r>
+              <a:rPr lang="en-US" dirty="0"/>
+              <a:t>Generation of raw counts from alignment .bam files</a:t>
+            </a:r>
+          </a:p>
+          <a:p>
+            <a:pPr marL="1028700" lvl="1" indent="-571500">
+              <a:buFont typeface="+mj-lt"/>
+              <a:buAutoNum type="romanUcPeriod"/>
+            </a:pPr>
+            <a:r>
+              <a:rPr lang="en-US" dirty="0" err="1"/>
+              <a:t>HTSeq</a:t>
+            </a:r>
+            <a:endParaRPr lang="en-US" dirty="0"/>
+          </a:p>
+          <a:p>
+            <a:pPr marL="571500" indent="-571500">
+              <a:buFont typeface="+mj-lt"/>
+              <a:buAutoNum type="romanUcPeriod"/>
+            </a:pPr>
+            <a:r>
+              <a:rPr lang="en-US" dirty="0"/>
+              <a:t>Differential Expression Analysis</a:t>
+            </a:r>
+          </a:p>
+          <a:p>
+            <a:pPr marL="1028700" lvl="1" indent="-571500">
+              <a:buFont typeface="+mj-lt"/>
+              <a:buAutoNum type="romanUcPeriod"/>
+            </a:pPr>
+            <a:r>
+              <a:rPr lang="en-US" dirty="0"/>
+              <a:t>DESeq2</a:t>
+            </a:r>
+          </a:p>
+          <a:p>
+            <a:pPr marL="571500" indent="-571500">
+              <a:buFont typeface="+mj-lt"/>
+              <a:buAutoNum type="romanUcPeriod"/>
+            </a:pPr>
+            <a:r>
+              <a:rPr lang="en-US" dirty="0"/>
+              <a:t>Pathway Analysis (KEGG</a:t>
+            </a:r>
+            <a:r>
+              <a:rPr lang="en-US" dirty="0" smtClean="0"/>
+              <a:t>)</a:t>
+            </a:r>
+          </a:p>
+          <a:p>
+            <a:pPr marL="0" indent="0">
+              <a:buNone/>
+            </a:pPr>
+            <a:r>
+              <a:rPr lang="en-US" dirty="0" smtClean="0"/>
+              <a:t>Notes</a:t>
+            </a:r>
+            <a:r>
+              <a:rPr lang="en-US" dirty="0"/>
+              <a:t>: Please </a:t>
+            </a:r>
+            <a:r>
+              <a:rPr lang="en-US" dirty="0" smtClean="0"/>
+              <a:t>see </a:t>
+            </a:r>
+            <a:r>
+              <a:rPr lang="en-US" dirty="0"/>
+              <a:t>our </a:t>
+            </a:r>
+            <a:r>
+              <a:rPr lang="en-US" dirty="0" err="1" smtClean="0"/>
+              <a:t>RNASeq</a:t>
+            </a:r>
+            <a:r>
+              <a:rPr lang="en-US" dirty="0" smtClean="0"/>
+              <a:t> (bulk) analysis page in our Methods </a:t>
+            </a:r>
+            <a:r>
+              <a:rPr lang="en-US" dirty="0"/>
+              <a:t>section for a publication-friendly </a:t>
+            </a:r>
+            <a:r>
+              <a:rPr lang="en-US" dirty="0" smtClean="0"/>
+              <a:t>write-up of </a:t>
+            </a:r>
+            <a:r>
+              <a:rPr lang="en-US" dirty="0"/>
+              <a:t>our workflow</a:t>
+            </a:r>
+          </a:p>
+          <a:p>
+            <a:pPr marL="0" indent="0">
+              <a:buNone/>
+            </a:pPr>
+            <a:endParaRPr lang="en-US" dirty="0"/>
+          </a:p>
+        </p:txBody>
+      </p:sp>
+    </p:spTree>
+    <p:extLst>
+      <p:ext uri="{BB962C8B-B14F-4D97-AF65-F5344CB8AC3E}">
+        <p14:creationId xmlns:p14="http://schemas.microsoft.com/office/powerpoint/2010/main" val="3979204288"/>
+      </p:ext>
+    </p:extLst>
+  </p:cSld>
+  <p:clrMapOvr>
+    <a:masterClrMapping/>
+  </p:clrMapOvr>
+  <p:timing>
+    <p:tnLst>
+      <p:par>
+        <p:cTn id="1" dur="indefinite" restart="never" nodeType="tmRoot"/>
+      </p:par>
+    </p:tnLst>
+  </p:timing>
+</p:sld>
+</file>
+
+<file path=ppt/slides/slide20.xml><?xml version="1.0" encoding="utf-8"?>
 <p:sld xmlns:a="http://schemas.openxmlformats.org/drawingml/2006/main" xmlns:r="http://schemas.openxmlformats.org/officeDocument/2006/relationships" xmlns:p="http://schemas.openxmlformats.org/presentationml/2006/main">
   <p:cSld>
     <p:spTree>
@@ -5049,7 +5795,7 @@
 </p:sld>
 </file>
 
-<file path=ppt/slides/slide19.xml><?xml version="1.0" encoding="utf-8"?>
+<file path=ppt/slides/slide21.xml><?xml version="1.0" encoding="utf-8"?>
 <p:sld xmlns:a="http://schemas.openxmlformats.org/drawingml/2006/main" xmlns:r="http://schemas.openxmlformats.org/officeDocument/2006/relationships" xmlns:p="http://schemas.openxmlformats.org/presentationml/2006/main">
   <p:cSld>
     <p:spTree>
@@ -5143,19 +5889,11 @@
             </a:pPr>
             <a:r>
               <a:rPr lang="en-US" sz="1800" dirty="0"/>
-              <a:t>Top </a:t>
-            </a:r>
-            <a:r>
-              <a:rPr lang="en-US" sz="1800" dirty="0"/>
-              <a:t>5</a:t>
+              <a:t>Top 5</a:t>
             </a:r>
             <a:r>
               <a:rPr lang="en-US" sz="1800" dirty="0" smtClean="0"/>
-              <a:t> </a:t>
-            </a:r>
-            <a:r>
-              <a:rPr lang="en-US" sz="1800" dirty="0" smtClean="0"/>
-              <a:t>DE </a:t>
+              <a:t> DE </a:t>
             </a:r>
             <a:r>
               <a:rPr lang="en-US" sz="1800" dirty="0"/>
@@ -5335,296 +6073,7 @@
 </p:sld>
 </file>
 
-<file path=ppt/slides/slide2.xml><?xml version="1.0" encoding="utf-8"?>
-<p:sld xmlns:a="http://schemas.openxmlformats.org/drawingml/2006/main" xmlns:r="http://schemas.openxmlformats.org/officeDocument/2006/relationships" xmlns:p="http://schemas.openxmlformats.org/presentationml/2006/main">
-  <p:cSld>
-    <p:spTree>
-      <p:nvGrpSpPr>
-        <p:cNvPr id="1" name=""/>
-        <p:cNvGrpSpPr/>
-        <p:nvPr/>
-      </p:nvGrpSpPr>
-      <p:grpSpPr>
-        <a:xfrm>
-          <a:off x="0" y="0"/>
-          <a:ext cx="0" cy="0"/>
-          <a:chOff x="0" y="0"/>
-          <a:chExt cx="0" cy="0"/>
-        </a:xfrm>
-      </p:grpSpPr>
-      <p:sp>
-        <p:nvSpPr>
-          <p:cNvPr id="2" name="Title 1">
-            <a:extLst>
-              <a:ext uri="{FF2B5EF4-FFF2-40B4-BE49-F238E27FC236}">
-                <a16:creationId xmlns:a16="http://schemas.microsoft.com/office/drawing/2014/main" id="{3A2D132A-48CD-CA44-9040-8CD5E5DD4DEB}"/>
-              </a:ext>
-            </a:extLst>
-          </p:cNvPr>
-          <p:cNvSpPr>
-            <a:spLocks noGrp="1"/>
-          </p:cNvSpPr>
-          <p:nvPr>
-            <p:ph type="title"/>
-          </p:nvPr>
-        </p:nvSpPr>
-        <p:spPr/>
-        <p:txBody>
-          <a:bodyPr/>
-          <a:lstStyle/>
-          <a:p>
-            <a:r>
-              <a:rPr lang="en-US" dirty="0" err="1"/>
-              <a:t>RNASeq</a:t>
-            </a:r>
-            <a:r>
-              <a:rPr lang="en-US" dirty="0"/>
-              <a:t> Analysis Workflow</a:t>
-            </a:r>
-          </a:p>
-        </p:txBody>
-      </p:sp>
-      <p:sp>
-        <p:nvSpPr>
-          <p:cNvPr id="3" name="Content Placeholder 2">
-            <a:extLst>
-              <a:ext uri="{FF2B5EF4-FFF2-40B4-BE49-F238E27FC236}">
-                <a16:creationId xmlns:a16="http://schemas.microsoft.com/office/drawing/2014/main" id="{BC867114-6E4A-F345-9EBB-6E085C92DE33}"/>
-              </a:ext>
-            </a:extLst>
-          </p:cNvPr>
-          <p:cNvSpPr>
-            <a:spLocks noGrp="1"/>
-          </p:cNvSpPr>
-          <p:nvPr>
-            <p:ph idx="1"/>
-          </p:nvPr>
-        </p:nvSpPr>
-        <p:spPr/>
-        <p:txBody>
-          <a:bodyPr>
-            <a:normAutofit fontScale="92500" lnSpcReduction="20000"/>
-          </a:bodyPr>
-          <a:lstStyle/>
-          <a:p>
-            <a:pPr marL="571500" indent="-571500">
-              <a:buFont typeface="+mj-lt"/>
-              <a:buAutoNum type="romanUcPeriod"/>
-            </a:pPr>
-            <a:r>
-              <a:rPr lang="en-US" dirty="0"/>
-              <a:t>QC at .</a:t>
-            </a:r>
-            <a:r>
-              <a:rPr lang="en-US" dirty="0" err="1"/>
-              <a:t>fastq</a:t>
-            </a:r>
-            <a:r>
-              <a:rPr lang="en-US" dirty="0"/>
-              <a:t> stage</a:t>
-            </a:r>
-          </a:p>
-          <a:p>
-            <a:pPr marL="1028700" lvl="1" indent="-571500">
-              <a:buFont typeface="+mj-lt"/>
-              <a:buAutoNum type="romanUcPeriod"/>
-            </a:pPr>
-            <a:r>
-              <a:rPr lang="en-US" dirty="0" err="1"/>
-              <a:t>FastQC</a:t>
-            </a:r>
-            <a:r>
-              <a:rPr lang="en-US" dirty="0"/>
-              <a:t> , </a:t>
-            </a:r>
-            <a:r>
-              <a:rPr lang="en-US" dirty="0" err="1"/>
-              <a:t>Fastq</a:t>
-            </a:r>
-            <a:r>
-              <a:rPr lang="en-US" dirty="0"/>
-              <a:t>-Screen, </a:t>
-            </a:r>
-            <a:r>
-              <a:rPr lang="en-US" dirty="0" err="1"/>
-              <a:t>MultiQC</a:t>
-            </a:r>
-            <a:r>
-              <a:rPr lang="en-US" dirty="0"/>
-              <a:t>, &amp; </a:t>
-            </a:r>
-            <a:r>
-              <a:rPr lang="en-US" dirty="0" err="1"/>
-              <a:t>Trimmomatic</a:t>
-            </a:r>
-            <a:r>
-              <a:rPr lang="en-US" dirty="0"/>
-              <a:t> if necessary</a:t>
-            </a:r>
-          </a:p>
-          <a:p>
-            <a:pPr marL="571500" indent="-571500">
-              <a:buFont typeface="+mj-lt"/>
-              <a:buAutoNum type="romanUcPeriod"/>
-            </a:pPr>
-            <a:r>
-              <a:rPr lang="en-US" dirty="0"/>
-              <a:t>Alignment to reference genome </a:t>
-            </a:r>
-          </a:p>
-          <a:p>
-            <a:pPr marL="1028700" lvl="1" indent="-571500">
-              <a:buFont typeface="+mj-lt"/>
-              <a:buAutoNum type="romanUcPeriod"/>
-            </a:pPr>
-            <a:r>
-              <a:rPr lang="en-US" dirty="0"/>
-              <a:t>STAR – mm10 genome for </a:t>
-            </a:r>
-            <a:r>
-              <a:rPr lang="en-US" i="1" dirty="0"/>
-              <a:t>M. musculus</a:t>
-            </a:r>
-            <a:r>
-              <a:rPr lang="en-US" dirty="0"/>
-              <a:t>, UCSC</a:t>
-            </a:r>
-          </a:p>
-          <a:p>
-            <a:pPr marL="1028700" lvl="1" indent="-571500">
-              <a:buFont typeface="+mj-lt"/>
-              <a:buAutoNum type="romanUcPeriod"/>
-            </a:pPr>
-            <a:r>
-              <a:rPr lang="en-US" dirty="0"/>
-              <a:t>Sort and index .bam files</a:t>
-            </a:r>
-          </a:p>
-          <a:p>
-            <a:pPr marL="571500" indent="-571500">
-              <a:buFont typeface="+mj-lt"/>
-              <a:buAutoNum type="romanUcPeriod"/>
-            </a:pPr>
-            <a:r>
-              <a:rPr lang="en-US" dirty="0"/>
-              <a:t>Generation of raw counts from alignment .bam files</a:t>
-            </a:r>
-          </a:p>
-          <a:p>
-            <a:pPr marL="1028700" lvl="1" indent="-571500">
-              <a:buFont typeface="+mj-lt"/>
-              <a:buAutoNum type="romanUcPeriod"/>
-            </a:pPr>
-            <a:r>
-              <a:rPr lang="en-US" dirty="0" err="1"/>
-              <a:t>HTSeq</a:t>
-            </a:r>
-            <a:endParaRPr lang="en-US" dirty="0"/>
-          </a:p>
-          <a:p>
-            <a:pPr marL="571500" indent="-571500">
-              <a:buFont typeface="+mj-lt"/>
-              <a:buAutoNum type="romanUcPeriod"/>
-            </a:pPr>
-            <a:r>
-              <a:rPr lang="en-US" dirty="0"/>
-              <a:t>Differential Expression Analysis</a:t>
-            </a:r>
-          </a:p>
-          <a:p>
-            <a:pPr marL="1028700" lvl="1" indent="-571500">
-              <a:buFont typeface="+mj-lt"/>
-              <a:buAutoNum type="romanUcPeriod"/>
-            </a:pPr>
-            <a:r>
-              <a:rPr lang="en-US" dirty="0"/>
-              <a:t>DESeq2</a:t>
-            </a:r>
-          </a:p>
-          <a:p>
-            <a:pPr marL="571500" indent="-571500">
-              <a:buFont typeface="+mj-lt"/>
-              <a:buAutoNum type="romanUcPeriod"/>
-            </a:pPr>
-            <a:r>
-              <a:rPr lang="en-US" dirty="0"/>
-              <a:t>Pathway Analysis (KEGG</a:t>
-            </a:r>
-            <a:r>
-              <a:rPr lang="en-US" dirty="0" smtClean="0"/>
-              <a:t>)</a:t>
-            </a:r>
-          </a:p>
-          <a:p>
-            <a:pPr marL="0" indent="0">
-              <a:buNone/>
-            </a:pPr>
-            <a:r>
-              <a:rPr lang="en-US" dirty="0" smtClean="0"/>
-              <a:t>Notes</a:t>
-            </a:r>
-            <a:r>
-              <a:rPr lang="en-US" dirty="0"/>
-              <a:t>: Please </a:t>
-            </a:r>
-            <a:r>
-              <a:rPr lang="en-US" dirty="0" smtClean="0"/>
-              <a:t>see </a:t>
-            </a:r>
-            <a:r>
-              <a:rPr lang="en-US" dirty="0"/>
-              <a:t>our </a:t>
-            </a:r>
-            <a:r>
-              <a:rPr lang="en-US" dirty="0" err="1" smtClean="0"/>
-              <a:t>RNASeq</a:t>
-            </a:r>
-            <a:r>
-              <a:rPr lang="en-US" dirty="0" smtClean="0"/>
-              <a:t> (bulk) analysis page in our Methods </a:t>
-            </a:r>
-            <a:r>
-              <a:rPr lang="en-US" dirty="0"/>
-              <a:t>section for a publication-friendly </a:t>
-            </a:r>
-            <a:r>
-              <a:rPr lang="en-US" dirty="0" smtClean="0"/>
-              <a:t>write-up of </a:t>
-            </a:r>
-            <a:r>
-              <a:rPr lang="en-US" dirty="0"/>
-              <a:t>our workflow</a:t>
-            </a:r>
-          </a:p>
-          <a:p>
-            <a:pPr marL="0" indent="0">
-              <a:buNone/>
-            </a:pPr>
-            <a:endParaRPr lang="en-US" dirty="0"/>
-          </a:p>
-        </p:txBody>
-      </p:sp>
-    </p:spTree>
-    <p:extLst>
-      <p:ext uri="{BB962C8B-B14F-4D97-AF65-F5344CB8AC3E}">
-        <p14:creationId xmlns:p14="http://schemas.microsoft.com/office/powerpoint/2010/main" val="3979204288"/>
-      </p:ext>
-    </p:extLst>
-  </p:cSld>
-  <p:clrMapOvr>
-    <a:masterClrMapping/>
-  </p:clrMapOvr>
-  <p:timing>
-    <p:tnLst>
-      <p:par>
-        <p:cTn id="1" dur="indefinite" restart="never" nodeType="tmRoot"/>
-      </p:par>
-    </p:tnLst>
-  </p:timing>
-</p:sld>
-</file>
-
-<file path=ppt/slides/slide20.xml><?xml version="1.0" encoding="utf-8"?>
+<file path=ppt/slides/slide22.xml><?xml version="1.0" encoding="utf-8"?>
 <p:sld xmlns:a="http://schemas.openxmlformats.org/drawingml/2006/main" xmlns:r="http://schemas.openxmlformats.org/officeDocument/2006/relationships" xmlns:p="http://schemas.openxmlformats.org/presentationml/2006/main">
   <p:cSld>
     <p:spTree>
@@ -5785,7 +6234,7 @@
 </p:sld>
 </file>
 
-<file path=ppt/slides/slide21.xml><?xml version="1.0" encoding="utf-8"?>
+<file path=ppt/slides/slide23.xml><?xml version="1.0" encoding="utf-8"?>
 <p:sld xmlns:a="http://schemas.openxmlformats.org/drawingml/2006/main" xmlns:r="http://schemas.openxmlformats.org/officeDocument/2006/relationships" xmlns:p="http://schemas.openxmlformats.org/presentationml/2006/main">
   <p:cSld>
     <p:spTree>
@@ -5935,7 +6384,7 @@
 </p:sld>
 </file>
 
-<file path=ppt/slides/slide22.xml><?xml version="1.0" encoding="utf-8"?>
+<file path=ppt/slides/slide24.xml><?xml version="1.0" encoding="utf-8"?>
 <p:sld xmlns:a="http://schemas.openxmlformats.org/drawingml/2006/main" xmlns:r="http://schemas.openxmlformats.org/officeDocument/2006/relationships" xmlns:p="http://schemas.openxmlformats.org/presentationml/2006/main">
   <p:cSld>
     <p:spTree>
@@ -6191,7 +6640,7 @@
 </p:sld>
 </file>
 
-<file path=ppt/slides/slide23.xml><?xml version="1.0" encoding="utf-8"?>
+<file path=ppt/slides/slide25.xml><?xml version="1.0" encoding="utf-8"?>
 <p:sld xmlns:a="http://schemas.openxmlformats.org/drawingml/2006/main" xmlns:r="http://schemas.openxmlformats.org/officeDocument/2006/relationships" xmlns:p="http://schemas.openxmlformats.org/presentationml/2006/main">
   <p:cSld>
     <p:spTree>

</xml_diff>